<commit_message>
chapt 2 part 1
</commit_message>
<xml_diff>
--- a/thesis_v1/Pictures/figure_chapter2.pptx
+++ b/thesis_v1/Pictures/figure_chapter2.pptx
@@ -11,6 +11,9 @@
     <p:sldId id="256" r:id="rId5"/>
     <p:sldId id="259" r:id="rId6"/>
     <p:sldId id="261" r:id="rId7"/>
+    <p:sldId id="262" r:id="rId8"/>
+    <p:sldId id="263" r:id="rId9"/>
+    <p:sldId id="264" r:id="rId10"/>
   </p:sldIdLst>
   <p:sldSz cx="12192000" cy="6858000"/>
   <p:notesSz cx="6858000" cy="9144000"/>
@@ -248,7 +251,7 @@
           <a:p>
             <a:fld id="{0AB158F5-A420-42E5-A89A-E1DF478DA356}" type="datetimeFigureOut">
               <a:rPr lang="en-US" smtClean="0"/>
-              <a:t>3/1/2016</a:t>
+              <a:t>3/2/2016</a:t>
             </a:fld>
             <a:endParaRPr lang="en-US"/>
           </a:p>
@@ -418,7 +421,7 @@
           <a:p>
             <a:fld id="{0AB158F5-A420-42E5-A89A-E1DF478DA356}" type="datetimeFigureOut">
               <a:rPr lang="en-US" smtClean="0"/>
-              <a:t>3/1/2016</a:t>
+              <a:t>3/2/2016</a:t>
             </a:fld>
             <a:endParaRPr lang="en-US"/>
           </a:p>
@@ -598,7 +601,7 @@
           <a:p>
             <a:fld id="{0AB158F5-A420-42E5-A89A-E1DF478DA356}" type="datetimeFigureOut">
               <a:rPr lang="en-US" smtClean="0"/>
-              <a:t>3/1/2016</a:t>
+              <a:t>3/2/2016</a:t>
             </a:fld>
             <a:endParaRPr lang="en-US"/>
           </a:p>
@@ -768,7 +771,7 @@
           <a:p>
             <a:fld id="{0AB158F5-A420-42E5-A89A-E1DF478DA356}" type="datetimeFigureOut">
               <a:rPr lang="en-US" smtClean="0"/>
-              <a:t>3/1/2016</a:t>
+              <a:t>3/2/2016</a:t>
             </a:fld>
             <a:endParaRPr lang="en-US"/>
           </a:p>
@@ -1021,7 +1024,7 @@
           <a:p>
             <a:fld id="{0AB158F5-A420-42E5-A89A-E1DF478DA356}" type="datetimeFigureOut">
               <a:rPr lang="en-US" smtClean="0"/>
-              <a:t>3/1/2016</a:t>
+              <a:t>3/2/2016</a:t>
             </a:fld>
             <a:endParaRPr lang="en-US"/>
           </a:p>
@@ -1253,7 +1256,7 @@
           <a:p>
             <a:fld id="{0AB158F5-A420-42E5-A89A-E1DF478DA356}" type="datetimeFigureOut">
               <a:rPr lang="en-US" smtClean="0"/>
-              <a:t>3/1/2016</a:t>
+              <a:t>3/2/2016</a:t>
             </a:fld>
             <a:endParaRPr lang="en-US"/>
           </a:p>
@@ -1620,7 +1623,7 @@
           <a:p>
             <a:fld id="{0AB158F5-A420-42E5-A89A-E1DF478DA356}" type="datetimeFigureOut">
               <a:rPr lang="en-US" smtClean="0"/>
-              <a:t>3/1/2016</a:t>
+              <a:t>3/2/2016</a:t>
             </a:fld>
             <a:endParaRPr lang="en-US"/>
           </a:p>
@@ -1738,7 +1741,7 @@
           <a:p>
             <a:fld id="{0AB158F5-A420-42E5-A89A-E1DF478DA356}" type="datetimeFigureOut">
               <a:rPr lang="en-US" smtClean="0"/>
-              <a:t>3/1/2016</a:t>
+              <a:t>3/2/2016</a:t>
             </a:fld>
             <a:endParaRPr lang="en-US"/>
           </a:p>
@@ -1833,7 +1836,7 @@
           <a:p>
             <a:fld id="{0AB158F5-A420-42E5-A89A-E1DF478DA356}" type="datetimeFigureOut">
               <a:rPr lang="en-US" smtClean="0"/>
-              <a:t>3/1/2016</a:t>
+              <a:t>3/2/2016</a:t>
             </a:fld>
             <a:endParaRPr lang="en-US"/>
           </a:p>
@@ -2110,7 +2113,7 @@
           <a:p>
             <a:fld id="{0AB158F5-A420-42E5-A89A-E1DF478DA356}" type="datetimeFigureOut">
               <a:rPr lang="en-US" smtClean="0"/>
-              <a:t>3/1/2016</a:t>
+              <a:t>3/2/2016</a:t>
             </a:fld>
             <a:endParaRPr lang="en-US"/>
           </a:p>
@@ -2363,7 +2366,7 @@
           <a:p>
             <a:fld id="{0AB158F5-A420-42E5-A89A-E1DF478DA356}" type="datetimeFigureOut">
               <a:rPr lang="en-US" smtClean="0"/>
-              <a:t>3/1/2016</a:t>
+              <a:t>3/2/2016</a:t>
             </a:fld>
             <a:endParaRPr lang="en-US"/>
           </a:p>
@@ -2576,7 +2579,7 @@
           <a:p>
             <a:fld id="{0AB158F5-A420-42E5-A89A-E1DF478DA356}" type="datetimeFigureOut">
               <a:rPr lang="en-US" smtClean="0"/>
-              <a:t>3/1/2016</a:t>
+              <a:t>3/2/2016</a:t>
             </a:fld>
             <a:endParaRPr lang="en-US"/>
           </a:p>
@@ -6263,7 +6266,19 @@
               </a:r>
               <a:r>
                 <a:rPr lang="zh-CN" altLang="en-US" dirty="0" smtClean="0"/>
-                <a:t>带间跃迁的连续吸收谱和离散的激子吸收谱</a:t>
+                <a:t>带</a:t>
+              </a:r>
+              <a:r>
+                <a:rPr lang="zh-CN" altLang="en-US" dirty="0" smtClean="0"/>
+                <a:t>间跃迁的吸</a:t>
+              </a:r>
+              <a:r>
+                <a:rPr lang="zh-CN" altLang="en-US" dirty="0" smtClean="0"/>
+                <a:t>收</a:t>
+              </a:r>
+              <a:r>
+                <a:rPr lang="zh-CN" altLang="en-US" dirty="0" smtClean="0"/>
+                <a:t>谱</a:t>
               </a:r>
               <a:endParaRPr lang="en-US" altLang="zh-CN" dirty="0" smtClean="0"/>
             </a:p>
@@ -11130,9 +11145,9 @@
         <p:grpSpPr>
           <a:xfrm>
             <a:off x="1624439" y="1450662"/>
-            <a:ext cx="8898419" cy="4775967"/>
+            <a:ext cx="8878461" cy="4758983"/>
             <a:chOff x="1624439" y="1450662"/>
-            <a:chExt cx="8898419" cy="4775967"/>
+            <a:chExt cx="8878461" cy="4758983"/>
           </a:xfrm>
         </p:grpSpPr>
         <p:pic>
@@ -11192,8 +11207,8 @@
           </p:blipFill>
           <p:spPr>
             <a:xfrm>
-              <a:off x="6313716" y="1819994"/>
-              <a:ext cx="4209142" cy="4406635"/>
+              <a:off x="6313716" y="1832183"/>
+              <a:ext cx="4189184" cy="4377461"/>
             </a:xfrm>
             <a:prstGeom prst="rect">
               <a:avLst/>
@@ -11233,11 +11248,7 @@
               <a:pPr algn="ctr"/>
               <a:r>
                 <a:rPr lang="en-US" dirty="0" smtClean="0"/>
-                <a:t>(a) </a:t>
-              </a:r>
-              <a:r>
-                <a:rPr lang="en-US" dirty="0" smtClean="0"/>
-                <a:t>Zeros Bias</a:t>
+                <a:t>(a) Zeros Bias</a:t>
               </a:r>
               <a:endParaRPr lang="en-US" dirty="0"/>
             </a:p>
@@ -11271,7 +11282,15 @@
               <a:pPr algn="ctr"/>
               <a:r>
                 <a:rPr lang="en-US" dirty="0" smtClean="0"/>
-                <a:t>(b) 20KV/cm</a:t>
+                <a:t>(b) </a:t>
+              </a:r>
+              <a:r>
+                <a:rPr lang="en-US" altLang="zh-CN" dirty="0" smtClean="0"/>
+                <a:t>18</a:t>
+              </a:r>
+              <a:r>
+                <a:rPr lang="en-US" dirty="0" smtClean="0"/>
+                <a:t>KV/cm</a:t>
               </a:r>
               <a:endParaRPr lang="en-US" dirty="0"/>
             </a:p>
@@ -11282,6 +11301,736 @@
     <p:extLst>
       <p:ext uri="{BB962C8B-B14F-4D97-AF65-F5344CB8AC3E}">
         <p14:creationId xmlns:p14="http://schemas.microsoft.com/office/powerpoint/2010/main" val="2108800687"/>
+      </p:ext>
+    </p:extLst>
+  </p:cSld>
+  <p:clrMapOvr>
+    <a:masterClrMapping/>
+  </p:clrMapOvr>
+</p:sld>
+</file>
+
+<file path=ppt/slides/slide7.xml><?xml version="1.0" encoding="utf-8"?>
+<p:sld xmlns:a="http://schemas.openxmlformats.org/drawingml/2006/main" xmlns:r="http://schemas.openxmlformats.org/officeDocument/2006/relationships" xmlns:p="http://schemas.openxmlformats.org/presentationml/2006/main">
+  <p:cSld>
+    <p:spTree>
+      <p:nvGrpSpPr>
+        <p:cNvPr id="1" name=""/>
+        <p:cNvGrpSpPr/>
+        <p:nvPr/>
+      </p:nvGrpSpPr>
+      <p:grpSpPr>
+        <a:xfrm>
+          <a:off x="0" y="0"/>
+          <a:ext cx="0" cy="0"/>
+          <a:chOff x="0" y="0"/>
+          <a:chExt cx="0" cy="0"/>
+        </a:xfrm>
+      </p:grpSpPr>
+      <p:grpSp>
+        <p:nvGrpSpPr>
+          <p:cNvPr id="26" name="Group 25"/>
+          <p:cNvGrpSpPr/>
+          <p:nvPr/>
+        </p:nvGrpSpPr>
+        <p:grpSpPr>
+          <a:xfrm>
+            <a:off x="490532" y="1235075"/>
+            <a:ext cx="11569705" cy="4324350"/>
+            <a:chOff x="490532" y="1235075"/>
+            <a:chExt cx="11569705" cy="4324350"/>
+          </a:xfrm>
+        </p:grpSpPr>
+        <p:grpSp>
+          <p:nvGrpSpPr>
+            <p:cNvPr id="22" name="Group 21"/>
+            <p:cNvGrpSpPr/>
+            <p:nvPr/>
+          </p:nvGrpSpPr>
+          <p:grpSpPr>
+            <a:xfrm>
+              <a:off x="534987" y="1235075"/>
+              <a:ext cx="11525250" cy="4324350"/>
+              <a:chOff x="452437" y="1304925"/>
+              <a:chExt cx="11525250" cy="4324350"/>
+            </a:xfrm>
+          </p:grpSpPr>
+          <p:grpSp>
+            <p:nvGrpSpPr>
+              <p:cNvPr id="7" name="Group 6"/>
+              <p:cNvGrpSpPr/>
+              <p:nvPr/>
+            </p:nvGrpSpPr>
+            <p:grpSpPr>
+              <a:xfrm>
+                <a:off x="452437" y="1304925"/>
+                <a:ext cx="11525250" cy="4324350"/>
+                <a:chOff x="433387" y="1476375"/>
+                <a:chExt cx="11525250" cy="4324350"/>
+              </a:xfrm>
+            </p:grpSpPr>
+            <p:pic>
+              <p:nvPicPr>
+                <p:cNvPr id="5" name="Picture 4"/>
+                <p:cNvPicPr>
+                  <a:picLocks noChangeAspect="1"/>
+                </p:cNvPicPr>
+                <p:nvPr/>
+              </p:nvPicPr>
+              <p:blipFill>
+                <a:blip r:embed="rId2">
+                  <a:extLst>
+                    <a:ext uri="{28A0092B-C50C-407E-A947-70E740481C1C}">
+                      <a14:useLocalDpi xmlns:a14="http://schemas.microsoft.com/office/drawing/2010/main" val="0"/>
+                    </a:ext>
+                  </a:extLst>
+                </a:blip>
+                <a:stretch>
+                  <a:fillRect/>
+                </a:stretch>
+              </p:blipFill>
+              <p:spPr>
+                <a:xfrm>
+                  <a:off x="433387" y="1476375"/>
+                  <a:ext cx="5762625" cy="4324350"/>
+                </a:xfrm>
+                <a:prstGeom prst="rect">
+                  <a:avLst/>
+                </a:prstGeom>
+              </p:spPr>
+            </p:pic>
+            <p:pic>
+              <p:nvPicPr>
+                <p:cNvPr id="6" name="Picture 5"/>
+                <p:cNvPicPr>
+                  <a:picLocks noChangeAspect="1"/>
+                </p:cNvPicPr>
+                <p:nvPr/>
+              </p:nvPicPr>
+              <p:blipFill>
+                <a:blip r:embed="rId3">
+                  <a:extLst>
+                    <a:ext uri="{28A0092B-C50C-407E-A947-70E740481C1C}">
+                      <a14:useLocalDpi xmlns:a14="http://schemas.microsoft.com/office/drawing/2010/main" val="0"/>
+                    </a:ext>
+                  </a:extLst>
+                </a:blip>
+                <a:stretch>
+                  <a:fillRect/>
+                </a:stretch>
+              </p:blipFill>
+              <p:spPr>
+                <a:xfrm>
+                  <a:off x="6196012" y="1476375"/>
+                  <a:ext cx="5762625" cy="4324350"/>
+                </a:xfrm>
+                <a:prstGeom prst="rect">
+                  <a:avLst/>
+                </a:prstGeom>
+              </p:spPr>
+            </p:pic>
+          </p:grpSp>
+          <p:sp>
+            <p:nvSpPr>
+              <p:cNvPr id="8" name="TextBox 7"/>
+              <p:cNvSpPr txBox="1"/>
+              <p:nvPr/>
+            </p:nvSpPr>
+            <p:spPr>
+              <a:xfrm>
+                <a:off x="4114800" y="1809750"/>
+                <a:ext cx="685800" cy="369332"/>
+              </a:xfrm>
+              <a:prstGeom prst="rect">
+                <a:avLst/>
+              </a:prstGeom>
+              <a:noFill/>
+              <a:ln>
+                <a:solidFill>
+                  <a:schemeClr val="tx1"/>
+                </a:solidFill>
+              </a:ln>
+            </p:spPr>
+            <p:txBody>
+              <a:bodyPr wrap="square" rtlCol="0">
+                <a:spAutoFit/>
+              </a:bodyPr>
+              <a:lstStyle/>
+              <a:p>
+                <a:pPr algn="ctr"/>
+                <a:r>
+                  <a:rPr lang="en-US" i="1" dirty="0" err="1" smtClean="0"/>
+                  <a:t>E</a:t>
+                </a:r>
+                <a:r>
+                  <a:rPr lang="en-US" i="1" baseline="-25000" dirty="0" err="1" smtClean="0"/>
+                  <a:t>e-</a:t>
+                </a:r>
+                <a:r>
+                  <a:rPr lang="en-US" altLang="zh-CN" i="1" baseline="-25000" dirty="0" err="1" smtClean="0"/>
+                  <a:t>hh</a:t>
+                </a:r>
+                <a:endParaRPr lang="en-US" i="1" dirty="0"/>
+              </a:p>
+            </p:txBody>
+          </p:sp>
+          <p:cxnSp>
+            <p:nvCxnSpPr>
+              <p:cNvPr id="11" name="Straight Arrow Connector 10"/>
+              <p:cNvCxnSpPr/>
+              <p:nvPr/>
+            </p:nvCxnSpPr>
+            <p:spPr>
+              <a:xfrm>
+                <a:off x="2847973" y="2457450"/>
+                <a:ext cx="323851" cy="552450"/>
+              </a:xfrm>
+              <a:prstGeom prst="straightConnector1">
+                <a:avLst/>
+              </a:prstGeom>
+              <a:ln>
+                <a:solidFill>
+                  <a:srgbClr val="00B050"/>
+                </a:solidFill>
+                <a:tailEnd type="triangle"/>
+              </a:ln>
+            </p:spPr>
+            <p:style>
+              <a:lnRef idx="1">
+                <a:schemeClr val="accent1"/>
+              </a:lnRef>
+              <a:fillRef idx="0">
+                <a:schemeClr val="accent1"/>
+              </a:fillRef>
+              <a:effectRef idx="0">
+                <a:schemeClr val="accent1"/>
+              </a:effectRef>
+              <a:fontRef idx="minor">
+                <a:schemeClr val="tx1"/>
+              </a:fontRef>
+            </p:style>
+          </p:cxnSp>
+          <p:sp>
+            <p:nvSpPr>
+              <p:cNvPr id="12" name="TextBox 11"/>
+              <p:cNvSpPr txBox="1"/>
+              <p:nvPr/>
+            </p:nvSpPr>
+            <p:spPr>
+              <a:xfrm>
+                <a:off x="1516250" y="2129909"/>
+                <a:ext cx="2528887" cy="369332"/>
+              </a:xfrm>
+              <a:prstGeom prst="rect">
+                <a:avLst/>
+              </a:prstGeom>
+              <a:noFill/>
+            </p:spPr>
+            <p:txBody>
+              <a:bodyPr wrap="square" rtlCol="0">
+                <a:spAutoFit/>
+              </a:bodyPr>
+              <a:lstStyle/>
+              <a:p>
+                <a:r>
+                  <a:rPr lang="en-US" dirty="0" smtClean="0"/>
+                  <a:t>With Binding Energy</a:t>
+                </a:r>
+                <a:endParaRPr lang="en-US" dirty="0"/>
+              </a:p>
+            </p:txBody>
+          </p:sp>
+          <p:sp>
+            <p:nvSpPr>
+              <p:cNvPr id="13" name="TextBox 12"/>
+              <p:cNvSpPr txBox="1"/>
+              <p:nvPr/>
+            </p:nvSpPr>
+            <p:spPr>
+              <a:xfrm>
+                <a:off x="1435893" y="3684091"/>
+                <a:ext cx="2528887" cy="369332"/>
+              </a:xfrm>
+              <a:prstGeom prst="rect">
+                <a:avLst/>
+              </a:prstGeom>
+              <a:noFill/>
+            </p:spPr>
+            <p:txBody>
+              <a:bodyPr wrap="square" rtlCol="0">
+                <a:spAutoFit/>
+              </a:bodyPr>
+              <a:lstStyle/>
+              <a:p>
+                <a:r>
+                  <a:rPr lang="en-US" dirty="0" smtClean="0"/>
+                  <a:t>Without Binding Energy</a:t>
+                </a:r>
+                <a:endParaRPr lang="en-US" dirty="0"/>
+              </a:p>
+            </p:txBody>
+          </p:sp>
+          <p:cxnSp>
+            <p:nvCxnSpPr>
+              <p:cNvPr id="14" name="Straight Arrow Connector 13"/>
+              <p:cNvCxnSpPr/>
+              <p:nvPr/>
+            </p:nvCxnSpPr>
+            <p:spPr>
+              <a:xfrm>
+                <a:off x="3171823" y="4053423"/>
+                <a:ext cx="323851" cy="552450"/>
+              </a:xfrm>
+              <a:prstGeom prst="straightConnector1">
+                <a:avLst/>
+              </a:prstGeom>
+              <a:ln>
+                <a:solidFill>
+                  <a:srgbClr val="0070C0"/>
+                </a:solidFill>
+                <a:tailEnd type="triangle"/>
+              </a:ln>
+            </p:spPr>
+            <p:style>
+              <a:lnRef idx="1">
+                <a:schemeClr val="accent1"/>
+              </a:lnRef>
+              <a:fillRef idx="0">
+                <a:schemeClr val="accent1"/>
+              </a:fillRef>
+              <a:effectRef idx="0">
+                <a:schemeClr val="accent1"/>
+              </a:effectRef>
+              <a:fontRef idx="minor">
+                <a:schemeClr val="tx1"/>
+              </a:fontRef>
+            </p:style>
+          </p:cxnSp>
+          <p:sp>
+            <p:nvSpPr>
+              <p:cNvPr id="15" name="TextBox 14"/>
+              <p:cNvSpPr txBox="1"/>
+              <p:nvPr/>
+            </p:nvSpPr>
+            <p:spPr>
+              <a:xfrm>
+                <a:off x="7008018" y="3467100"/>
+                <a:ext cx="2528887" cy="369332"/>
+              </a:xfrm>
+              <a:prstGeom prst="rect">
+                <a:avLst/>
+              </a:prstGeom>
+              <a:noFill/>
+            </p:spPr>
+            <p:txBody>
+              <a:bodyPr wrap="square" rtlCol="0">
+                <a:spAutoFit/>
+              </a:bodyPr>
+              <a:lstStyle/>
+              <a:p>
+                <a:r>
+                  <a:rPr lang="en-US" dirty="0" smtClean="0"/>
+                  <a:t>Without Binding Energy</a:t>
+                </a:r>
+                <a:endParaRPr lang="en-US" dirty="0"/>
+              </a:p>
+            </p:txBody>
+          </p:sp>
+          <p:cxnSp>
+            <p:nvCxnSpPr>
+              <p:cNvPr id="16" name="Straight Arrow Connector 15"/>
+              <p:cNvCxnSpPr/>
+              <p:nvPr/>
+            </p:nvCxnSpPr>
+            <p:spPr>
+              <a:xfrm>
+                <a:off x="8715371" y="3868757"/>
+                <a:ext cx="323851" cy="704314"/>
+              </a:xfrm>
+              <a:prstGeom prst="straightConnector1">
+                <a:avLst/>
+              </a:prstGeom>
+              <a:ln>
+                <a:solidFill>
+                  <a:srgbClr val="0070C0"/>
+                </a:solidFill>
+                <a:tailEnd type="triangle"/>
+              </a:ln>
+            </p:spPr>
+            <p:style>
+              <a:lnRef idx="1">
+                <a:schemeClr val="accent1"/>
+              </a:lnRef>
+              <a:fillRef idx="0">
+                <a:schemeClr val="accent1"/>
+              </a:fillRef>
+              <a:effectRef idx="0">
+                <a:schemeClr val="accent1"/>
+              </a:effectRef>
+              <a:fontRef idx="minor">
+                <a:schemeClr val="tx1"/>
+              </a:fontRef>
+            </p:style>
+          </p:cxnSp>
+          <p:cxnSp>
+            <p:nvCxnSpPr>
+              <p:cNvPr id="18" name="Straight Arrow Connector 17"/>
+              <p:cNvCxnSpPr/>
+              <p:nvPr/>
+            </p:nvCxnSpPr>
+            <p:spPr>
+              <a:xfrm>
+                <a:off x="9536905" y="2875478"/>
+                <a:ext cx="323851" cy="552450"/>
+              </a:xfrm>
+              <a:prstGeom prst="straightConnector1">
+                <a:avLst/>
+              </a:prstGeom>
+              <a:ln>
+                <a:solidFill>
+                  <a:srgbClr val="00B050"/>
+                </a:solidFill>
+                <a:tailEnd type="triangle"/>
+              </a:ln>
+            </p:spPr>
+            <p:style>
+              <a:lnRef idx="1">
+                <a:schemeClr val="accent1"/>
+              </a:lnRef>
+              <a:fillRef idx="0">
+                <a:schemeClr val="accent1"/>
+              </a:fillRef>
+              <a:effectRef idx="0">
+                <a:schemeClr val="accent1"/>
+              </a:effectRef>
+              <a:fontRef idx="minor">
+                <a:schemeClr val="tx1"/>
+              </a:fontRef>
+            </p:style>
+          </p:cxnSp>
+          <p:sp>
+            <p:nvSpPr>
+              <p:cNvPr id="19" name="TextBox 18"/>
+              <p:cNvSpPr txBox="1"/>
+              <p:nvPr/>
+            </p:nvSpPr>
+            <p:spPr>
+              <a:xfrm>
+                <a:off x="8384988" y="2473821"/>
+                <a:ext cx="2178238" cy="369332"/>
+              </a:xfrm>
+              <a:prstGeom prst="rect">
+                <a:avLst/>
+              </a:prstGeom>
+              <a:noFill/>
+            </p:spPr>
+            <p:txBody>
+              <a:bodyPr wrap="square" rtlCol="0">
+                <a:spAutoFit/>
+              </a:bodyPr>
+              <a:lstStyle/>
+              <a:p>
+                <a:r>
+                  <a:rPr lang="en-US" dirty="0" smtClean="0"/>
+                  <a:t>With Binding Energy</a:t>
+                </a:r>
+                <a:endParaRPr lang="en-US" dirty="0"/>
+              </a:p>
+            </p:txBody>
+          </p:sp>
+          <p:sp>
+            <p:nvSpPr>
+              <p:cNvPr id="20" name="Rectangle 19"/>
+              <p:cNvSpPr/>
+              <p:nvPr/>
+            </p:nvSpPr>
+            <p:spPr>
+              <a:xfrm>
+                <a:off x="1285875" y="1669018"/>
+                <a:ext cx="498855" cy="369332"/>
+              </a:xfrm>
+              <a:prstGeom prst="rect">
+                <a:avLst/>
+              </a:prstGeom>
+            </p:spPr>
+            <p:txBody>
+              <a:bodyPr wrap="none">
+                <a:spAutoFit/>
+              </a:bodyPr>
+              <a:lstStyle/>
+              <a:p>
+                <a:r>
+                  <a:rPr lang="en-US" dirty="0"/>
+                  <a:t>(a) </a:t>
+                </a:r>
+              </a:p>
+            </p:txBody>
+          </p:sp>
+          <p:sp>
+            <p:nvSpPr>
+              <p:cNvPr id="21" name="Rectangle 20"/>
+              <p:cNvSpPr/>
+              <p:nvPr/>
+            </p:nvSpPr>
+            <p:spPr>
+              <a:xfrm>
+                <a:off x="7048500" y="1739384"/>
+                <a:ext cx="511679" cy="369332"/>
+              </a:xfrm>
+              <a:prstGeom prst="rect">
+                <a:avLst/>
+              </a:prstGeom>
+            </p:spPr>
+            <p:txBody>
+              <a:bodyPr wrap="none">
+                <a:spAutoFit/>
+              </a:bodyPr>
+              <a:lstStyle/>
+              <a:p>
+                <a:r>
+                  <a:rPr lang="en-US" dirty="0" smtClean="0"/>
+                  <a:t>(b) </a:t>
+                </a:r>
+                <a:endParaRPr lang="en-US" dirty="0"/>
+              </a:p>
+            </p:txBody>
+          </p:sp>
+          <p:sp>
+            <p:nvSpPr>
+              <p:cNvPr id="23" name="TextBox 22"/>
+              <p:cNvSpPr txBox="1"/>
+              <p:nvPr/>
+            </p:nvSpPr>
+            <p:spPr>
+              <a:xfrm>
+                <a:off x="9838531" y="1809750"/>
+                <a:ext cx="685800" cy="369332"/>
+              </a:xfrm>
+              <a:prstGeom prst="rect">
+                <a:avLst/>
+              </a:prstGeom>
+              <a:noFill/>
+              <a:ln>
+                <a:solidFill>
+                  <a:schemeClr val="tx1"/>
+                </a:solidFill>
+              </a:ln>
+            </p:spPr>
+            <p:txBody>
+              <a:bodyPr wrap="square" rtlCol="0">
+                <a:spAutoFit/>
+              </a:bodyPr>
+              <a:lstStyle/>
+              <a:p>
+                <a:pPr algn="ctr"/>
+                <a:r>
+                  <a:rPr lang="en-US" i="1" dirty="0" err="1" smtClean="0"/>
+                  <a:t>E</a:t>
+                </a:r>
+                <a:r>
+                  <a:rPr lang="en-US" i="1" baseline="-25000" dirty="0" err="1" smtClean="0"/>
+                  <a:t>e-</a:t>
+                </a:r>
+                <a:r>
+                  <a:rPr lang="en-US" altLang="zh-CN" i="1" baseline="-25000" dirty="0" err="1" smtClean="0"/>
+                  <a:t>lh</a:t>
+                </a:r>
+                <a:endParaRPr lang="en-US" i="1" dirty="0"/>
+              </a:p>
+            </p:txBody>
+          </p:sp>
+        </p:grpSp>
+        <p:sp>
+          <p:nvSpPr>
+            <p:cNvPr id="24" name="TextBox 23"/>
+            <p:cNvSpPr txBox="1"/>
+            <p:nvPr/>
+          </p:nvSpPr>
+          <p:spPr>
+            <a:xfrm rot="16200000">
+              <a:off x="-746031" y="3116163"/>
+              <a:ext cx="2842458" cy="369332"/>
+            </a:xfrm>
+            <a:prstGeom prst="rect">
+              <a:avLst/>
+            </a:prstGeom>
+            <a:solidFill>
+              <a:schemeClr val="bg1"/>
+            </a:solidFill>
+          </p:spPr>
+          <p:txBody>
+            <a:bodyPr wrap="square" rtlCol="0">
+              <a:spAutoFit/>
+            </a:bodyPr>
+            <a:lstStyle/>
+            <a:p>
+              <a:pPr algn="ctr"/>
+              <a:r>
+                <a:rPr lang="en-US" dirty="0" smtClean="0"/>
+                <a:t>Absorption Edge (nm)</a:t>
+              </a:r>
+              <a:endParaRPr lang="en-US" dirty="0"/>
+            </a:p>
+          </p:txBody>
+        </p:sp>
+        <p:sp>
+          <p:nvSpPr>
+            <p:cNvPr id="25" name="TextBox 24"/>
+            <p:cNvSpPr txBox="1"/>
+            <p:nvPr/>
+          </p:nvSpPr>
+          <p:spPr>
+            <a:xfrm rot="16200000">
+              <a:off x="4980692" y="3212584"/>
+              <a:ext cx="2842458" cy="369332"/>
+            </a:xfrm>
+            <a:prstGeom prst="rect">
+              <a:avLst/>
+            </a:prstGeom>
+            <a:solidFill>
+              <a:schemeClr val="bg1"/>
+            </a:solidFill>
+          </p:spPr>
+          <p:txBody>
+            <a:bodyPr wrap="square" rtlCol="0">
+              <a:spAutoFit/>
+            </a:bodyPr>
+            <a:lstStyle/>
+            <a:p>
+              <a:pPr algn="ctr"/>
+              <a:r>
+                <a:rPr lang="en-US" dirty="0" smtClean="0"/>
+                <a:t>Absorption Edge (nm)</a:t>
+              </a:r>
+              <a:endParaRPr lang="en-US" dirty="0"/>
+            </a:p>
+          </p:txBody>
+        </p:sp>
+      </p:grpSp>
+    </p:spTree>
+    <p:extLst>
+      <p:ext uri="{BB962C8B-B14F-4D97-AF65-F5344CB8AC3E}">
+        <p14:creationId xmlns:p14="http://schemas.microsoft.com/office/powerpoint/2010/main" val="3539181588"/>
+      </p:ext>
+    </p:extLst>
+  </p:cSld>
+  <p:clrMapOvr>
+    <a:masterClrMapping/>
+  </p:clrMapOvr>
+</p:sld>
+</file>
+
+<file path=ppt/slides/slide8.xml><?xml version="1.0" encoding="utf-8"?>
+<p:sld xmlns:a="http://schemas.openxmlformats.org/drawingml/2006/main" xmlns:r="http://schemas.openxmlformats.org/officeDocument/2006/relationships" xmlns:p="http://schemas.openxmlformats.org/presentationml/2006/main">
+  <p:cSld>
+    <p:spTree>
+      <p:nvGrpSpPr>
+        <p:cNvPr id="1" name=""/>
+        <p:cNvGrpSpPr/>
+        <p:nvPr/>
+      </p:nvGrpSpPr>
+      <p:grpSpPr>
+        <a:xfrm>
+          <a:off x="0" y="0"/>
+          <a:ext cx="0" cy="0"/>
+          <a:chOff x="0" y="0"/>
+          <a:chExt cx="0" cy="0"/>
+        </a:xfrm>
+      </p:grpSpPr>
+      <p:pic>
+        <p:nvPicPr>
+          <p:cNvPr id="6" name="Picture 5"/>
+          <p:cNvPicPr>
+            <a:picLocks noChangeAspect="1"/>
+          </p:cNvPicPr>
+          <p:nvPr/>
+        </p:nvPicPr>
+        <p:blipFill>
+          <a:blip r:embed="rId2">
+            <a:extLst>
+              <a:ext uri="{28A0092B-C50C-407E-A947-70E740481C1C}">
+                <a14:useLocalDpi xmlns:a14="http://schemas.microsoft.com/office/drawing/2010/main" val="0"/>
+              </a:ext>
+            </a:extLst>
+          </a:blip>
+          <a:stretch>
+            <a:fillRect/>
+          </a:stretch>
+        </p:blipFill>
+        <p:spPr>
+          <a:xfrm>
+            <a:off x="6211887" y="1266825"/>
+            <a:ext cx="5762625" cy="4324350"/>
+          </a:xfrm>
+          <a:prstGeom prst="rect">
+            <a:avLst/>
+          </a:prstGeom>
+        </p:spPr>
+      </p:pic>
+      <p:pic>
+        <p:nvPicPr>
+          <p:cNvPr id="7" name="Picture 6"/>
+          <p:cNvPicPr>
+            <a:picLocks noChangeAspect="1"/>
+          </p:cNvPicPr>
+          <p:nvPr/>
+        </p:nvPicPr>
+        <p:blipFill>
+          <a:blip r:embed="rId3">
+            <a:extLst>
+              <a:ext uri="{28A0092B-C50C-407E-A947-70E740481C1C}">
+                <a14:useLocalDpi xmlns:a14="http://schemas.microsoft.com/office/drawing/2010/main" val="0"/>
+              </a:ext>
+            </a:extLst>
+          </a:blip>
+          <a:stretch>
+            <a:fillRect/>
+          </a:stretch>
+        </p:blipFill>
+        <p:spPr>
+          <a:xfrm>
+            <a:off x="449262" y="1266825"/>
+            <a:ext cx="5762625" cy="4324350"/>
+          </a:xfrm>
+          <a:prstGeom prst="rect">
+            <a:avLst/>
+          </a:prstGeom>
+        </p:spPr>
+      </p:pic>
+    </p:spTree>
+    <p:extLst>
+      <p:ext uri="{BB962C8B-B14F-4D97-AF65-F5344CB8AC3E}">
+        <p14:creationId xmlns:p14="http://schemas.microsoft.com/office/powerpoint/2010/main" val="845912156"/>
+      </p:ext>
+    </p:extLst>
+  </p:cSld>
+  <p:clrMapOvr>
+    <a:masterClrMapping/>
+  </p:clrMapOvr>
+</p:sld>
+</file>
+
+<file path=ppt/slides/slide9.xml><?xml version="1.0" encoding="utf-8"?>
+<p:sld xmlns:a="http://schemas.openxmlformats.org/drawingml/2006/main" xmlns:r="http://schemas.openxmlformats.org/officeDocument/2006/relationships" xmlns:p="http://schemas.openxmlformats.org/presentationml/2006/main">
+  <p:cSld>
+    <p:spTree>
+      <p:nvGrpSpPr>
+        <p:cNvPr id="1" name=""/>
+        <p:cNvGrpSpPr/>
+        <p:nvPr/>
+      </p:nvGrpSpPr>
+      <p:grpSpPr>
+        <a:xfrm>
+          <a:off x="0" y="0"/>
+          <a:ext cx="0" cy="0"/>
+          <a:chOff x="0" y="0"/>
+          <a:chExt cx="0" cy="0"/>
+        </a:xfrm>
+      </p:grpSpPr>
+    </p:spTree>
+    <p:extLst>
+      <p:ext uri="{BB962C8B-B14F-4D97-AF65-F5344CB8AC3E}">
+        <p14:creationId xmlns:p14="http://schemas.microsoft.com/office/powerpoint/2010/main" val="3182379709"/>
       </p:ext>
     </p:extLst>
   </p:cSld>

</xml_diff>

<commit_message>
chapter 2 section 2.1
</commit_message>
<xml_diff>
--- a/thesis_v1/Pictures/figure_chapter2.pptx
+++ b/thesis_v1/Pictures/figure_chapter2.pptx
@@ -13,7 +13,10 @@
     <p:sldId id="261" r:id="rId7"/>
     <p:sldId id="262" r:id="rId8"/>
     <p:sldId id="263" r:id="rId9"/>
-    <p:sldId id="264" r:id="rId10"/>
+    <p:sldId id="265" r:id="rId10"/>
+    <p:sldId id="264" r:id="rId11"/>
+    <p:sldId id="266" r:id="rId12"/>
+    <p:sldId id="267" r:id="rId13"/>
   </p:sldIdLst>
   <p:sldSz cx="12192000" cy="6858000"/>
   <p:notesSz cx="6858000" cy="9144000"/>
@@ -251,7 +254,7 @@
           <a:p>
             <a:fld id="{0AB158F5-A420-42E5-A89A-E1DF478DA356}" type="datetimeFigureOut">
               <a:rPr lang="en-US" smtClean="0"/>
-              <a:t>3/2/2016</a:t>
+              <a:t>3/6/2016</a:t>
             </a:fld>
             <a:endParaRPr lang="en-US"/>
           </a:p>
@@ -421,7 +424,7 @@
           <a:p>
             <a:fld id="{0AB158F5-A420-42E5-A89A-E1DF478DA356}" type="datetimeFigureOut">
               <a:rPr lang="en-US" smtClean="0"/>
-              <a:t>3/2/2016</a:t>
+              <a:t>3/6/2016</a:t>
             </a:fld>
             <a:endParaRPr lang="en-US"/>
           </a:p>
@@ -601,7 +604,7 @@
           <a:p>
             <a:fld id="{0AB158F5-A420-42E5-A89A-E1DF478DA356}" type="datetimeFigureOut">
               <a:rPr lang="en-US" smtClean="0"/>
-              <a:t>3/2/2016</a:t>
+              <a:t>3/6/2016</a:t>
             </a:fld>
             <a:endParaRPr lang="en-US"/>
           </a:p>
@@ -771,7 +774,7 @@
           <a:p>
             <a:fld id="{0AB158F5-A420-42E5-A89A-E1DF478DA356}" type="datetimeFigureOut">
               <a:rPr lang="en-US" smtClean="0"/>
-              <a:t>3/2/2016</a:t>
+              <a:t>3/6/2016</a:t>
             </a:fld>
             <a:endParaRPr lang="en-US"/>
           </a:p>
@@ -1024,7 +1027,7 @@
           <a:p>
             <a:fld id="{0AB158F5-A420-42E5-A89A-E1DF478DA356}" type="datetimeFigureOut">
               <a:rPr lang="en-US" smtClean="0"/>
-              <a:t>3/2/2016</a:t>
+              <a:t>3/6/2016</a:t>
             </a:fld>
             <a:endParaRPr lang="en-US"/>
           </a:p>
@@ -1256,7 +1259,7 @@
           <a:p>
             <a:fld id="{0AB158F5-A420-42E5-A89A-E1DF478DA356}" type="datetimeFigureOut">
               <a:rPr lang="en-US" smtClean="0"/>
-              <a:t>3/2/2016</a:t>
+              <a:t>3/6/2016</a:t>
             </a:fld>
             <a:endParaRPr lang="en-US"/>
           </a:p>
@@ -1623,7 +1626,7 @@
           <a:p>
             <a:fld id="{0AB158F5-A420-42E5-A89A-E1DF478DA356}" type="datetimeFigureOut">
               <a:rPr lang="en-US" smtClean="0"/>
-              <a:t>3/2/2016</a:t>
+              <a:t>3/6/2016</a:t>
             </a:fld>
             <a:endParaRPr lang="en-US"/>
           </a:p>
@@ -1741,7 +1744,7 @@
           <a:p>
             <a:fld id="{0AB158F5-A420-42E5-A89A-E1DF478DA356}" type="datetimeFigureOut">
               <a:rPr lang="en-US" smtClean="0"/>
-              <a:t>3/2/2016</a:t>
+              <a:t>3/6/2016</a:t>
             </a:fld>
             <a:endParaRPr lang="en-US"/>
           </a:p>
@@ -1836,7 +1839,7 @@
           <a:p>
             <a:fld id="{0AB158F5-A420-42E5-A89A-E1DF478DA356}" type="datetimeFigureOut">
               <a:rPr lang="en-US" smtClean="0"/>
-              <a:t>3/2/2016</a:t>
+              <a:t>3/6/2016</a:t>
             </a:fld>
             <a:endParaRPr lang="en-US"/>
           </a:p>
@@ -2113,7 +2116,7 @@
           <a:p>
             <a:fld id="{0AB158F5-A420-42E5-A89A-E1DF478DA356}" type="datetimeFigureOut">
               <a:rPr lang="en-US" smtClean="0"/>
-              <a:t>3/2/2016</a:t>
+              <a:t>3/6/2016</a:t>
             </a:fld>
             <a:endParaRPr lang="en-US"/>
           </a:p>
@@ -2366,7 +2369,7 @@
           <a:p>
             <a:fld id="{0AB158F5-A420-42E5-A89A-E1DF478DA356}" type="datetimeFigureOut">
               <a:rPr lang="en-US" smtClean="0"/>
-              <a:t>3/2/2016</a:t>
+              <a:t>3/6/2016</a:t>
             </a:fld>
             <a:endParaRPr lang="en-US"/>
           </a:p>
@@ -2579,7 +2582,7 @@
           <a:p>
             <a:fld id="{0AB158F5-A420-42E5-A89A-E1DF478DA356}" type="datetimeFigureOut">
               <a:rPr lang="en-US" smtClean="0"/>
-              <a:t>3/2/2016</a:t>
+              <a:t>3/6/2016</a:t>
             </a:fld>
             <a:endParaRPr lang="en-US"/>
           </a:p>
@@ -5731,6 +5734,3636 @@
 </p:sld>
 </file>
 
+<file path=ppt/slides/slide10.xml><?xml version="1.0" encoding="utf-8"?>
+<p:sld xmlns:a="http://schemas.openxmlformats.org/drawingml/2006/main" xmlns:r="http://schemas.openxmlformats.org/officeDocument/2006/relationships" xmlns:p="http://schemas.openxmlformats.org/presentationml/2006/main">
+  <p:cSld>
+    <p:spTree>
+      <p:nvGrpSpPr>
+        <p:cNvPr id="1" name=""/>
+        <p:cNvGrpSpPr/>
+        <p:nvPr/>
+      </p:nvGrpSpPr>
+      <p:grpSpPr>
+        <a:xfrm>
+          <a:off x="0" y="0"/>
+          <a:ext cx="0" cy="0"/>
+          <a:chOff x="0" y="0"/>
+          <a:chExt cx="0" cy="0"/>
+        </a:xfrm>
+      </p:grpSpPr>
+      <p:grpSp>
+        <p:nvGrpSpPr>
+          <p:cNvPr id="52" name="Group 51"/>
+          <p:cNvGrpSpPr/>
+          <p:nvPr/>
+        </p:nvGrpSpPr>
+        <p:grpSpPr>
+          <a:xfrm>
+            <a:off x="3439012" y="830963"/>
+            <a:ext cx="4809638" cy="5135326"/>
+            <a:chOff x="3439012" y="830963"/>
+            <a:chExt cx="4809638" cy="5135326"/>
+          </a:xfrm>
+        </p:grpSpPr>
+        <p:grpSp>
+          <p:nvGrpSpPr>
+            <p:cNvPr id="21" name="Group 20"/>
+            <p:cNvGrpSpPr/>
+            <p:nvPr/>
+          </p:nvGrpSpPr>
+          <p:grpSpPr>
+            <a:xfrm>
+              <a:off x="3799500" y="830963"/>
+              <a:ext cx="4449150" cy="2110437"/>
+              <a:chOff x="1211580" y="1729201"/>
+              <a:chExt cx="2776567" cy="2110437"/>
+            </a:xfrm>
+          </p:grpSpPr>
+          <p:grpSp>
+            <p:nvGrpSpPr>
+              <p:cNvPr id="7" name="Group 6"/>
+              <p:cNvGrpSpPr/>
+              <p:nvPr/>
+            </p:nvGrpSpPr>
+            <p:grpSpPr>
+              <a:xfrm>
+                <a:off x="1211580" y="1813560"/>
+                <a:ext cx="1965960" cy="1943102"/>
+                <a:chOff x="728207" y="1813560"/>
+                <a:chExt cx="2449333" cy="1943102"/>
+              </a:xfrm>
+            </p:grpSpPr>
+            <p:pic>
+              <p:nvPicPr>
+                <p:cNvPr id="2" name="Picture 1"/>
+                <p:cNvPicPr>
+                  <a:picLocks noChangeAspect="1"/>
+                </p:cNvPicPr>
+                <p:nvPr/>
+              </p:nvPicPr>
+              <p:blipFill>
+                <a:blip r:embed="rId2"/>
+                <a:stretch>
+                  <a:fillRect/>
+                </a:stretch>
+              </p:blipFill>
+              <p:spPr>
+                <a:xfrm>
+                  <a:off x="728207" y="1821543"/>
+                  <a:ext cx="2447925" cy="1736998"/>
+                </a:xfrm>
+                <a:prstGeom prst="rect">
+                  <a:avLst/>
+                </a:prstGeom>
+              </p:spPr>
+            </p:pic>
+            <p:sp>
+              <p:nvSpPr>
+                <p:cNvPr id="3" name="Rectangle 2"/>
+                <p:cNvSpPr/>
+                <p:nvPr/>
+              </p:nvSpPr>
+              <p:spPr>
+                <a:xfrm>
+                  <a:off x="731520" y="1813560"/>
+                  <a:ext cx="2446020" cy="106680"/>
+                </a:xfrm>
+                <a:prstGeom prst="rect">
+                  <a:avLst/>
+                </a:prstGeom>
+                <a:solidFill>
+                  <a:schemeClr val="accent4">
+                    <a:lumMod val="75000"/>
+                  </a:schemeClr>
+                </a:solidFill>
+                <a:ln>
+                  <a:noFill/>
+                </a:ln>
+              </p:spPr>
+              <p:style>
+                <a:lnRef idx="2">
+                  <a:schemeClr val="accent1">
+                    <a:shade val="50000"/>
+                  </a:schemeClr>
+                </a:lnRef>
+                <a:fillRef idx="1">
+                  <a:schemeClr val="accent1"/>
+                </a:fillRef>
+                <a:effectRef idx="0">
+                  <a:schemeClr val="accent1"/>
+                </a:effectRef>
+                <a:fontRef idx="minor">
+                  <a:schemeClr val="lt1"/>
+                </a:fontRef>
+              </p:style>
+              <p:txBody>
+                <a:bodyPr rtlCol="0" anchor="ctr"/>
+                <a:lstStyle/>
+                <a:p>
+                  <a:pPr algn="ctr"/>
+                  <a:endParaRPr lang="en-US"/>
+                </a:p>
+              </p:txBody>
+            </p:sp>
+            <p:sp>
+              <p:nvSpPr>
+                <p:cNvPr id="4" name="Rectangle 3"/>
+                <p:cNvSpPr/>
+                <p:nvPr/>
+              </p:nvSpPr>
+              <p:spPr>
+                <a:xfrm>
+                  <a:off x="730112" y="3147060"/>
+                  <a:ext cx="2446020" cy="160020"/>
+                </a:xfrm>
+                <a:prstGeom prst="rect">
+                  <a:avLst/>
+                </a:prstGeom>
+                <a:solidFill>
+                  <a:srgbClr val="FF0000"/>
+                </a:solidFill>
+                <a:ln>
+                  <a:noFill/>
+                </a:ln>
+              </p:spPr>
+              <p:style>
+                <a:lnRef idx="2">
+                  <a:schemeClr val="accent1">
+                    <a:shade val="50000"/>
+                  </a:schemeClr>
+                </a:lnRef>
+                <a:fillRef idx="1">
+                  <a:schemeClr val="accent1"/>
+                </a:fillRef>
+                <a:effectRef idx="0">
+                  <a:schemeClr val="accent1"/>
+                </a:effectRef>
+                <a:fontRef idx="minor">
+                  <a:schemeClr val="lt1"/>
+                </a:fontRef>
+              </p:style>
+              <p:txBody>
+                <a:bodyPr rtlCol="0" anchor="ctr"/>
+                <a:lstStyle/>
+                <a:p>
+                  <a:pPr algn="ctr"/>
+                  <a:endParaRPr lang="en-US"/>
+                </a:p>
+              </p:txBody>
+            </p:sp>
+            <p:sp>
+              <p:nvSpPr>
+                <p:cNvPr id="5" name="Rectangle 4"/>
+                <p:cNvSpPr/>
+                <p:nvPr/>
+              </p:nvSpPr>
+              <p:spPr>
+                <a:xfrm>
+                  <a:off x="730112" y="3463291"/>
+                  <a:ext cx="2446020" cy="137160"/>
+                </a:xfrm>
+                <a:prstGeom prst="rect">
+                  <a:avLst/>
+                </a:prstGeom>
+                <a:solidFill>
+                  <a:srgbClr val="FF0000"/>
+                </a:solidFill>
+                <a:ln>
+                  <a:noFill/>
+                </a:ln>
+              </p:spPr>
+              <p:style>
+                <a:lnRef idx="2">
+                  <a:schemeClr val="accent1">
+                    <a:shade val="50000"/>
+                  </a:schemeClr>
+                </a:lnRef>
+                <a:fillRef idx="1">
+                  <a:schemeClr val="accent1"/>
+                </a:fillRef>
+                <a:effectRef idx="0">
+                  <a:schemeClr val="accent1"/>
+                </a:effectRef>
+                <a:fontRef idx="minor">
+                  <a:schemeClr val="lt1"/>
+                </a:fontRef>
+              </p:style>
+              <p:txBody>
+                <a:bodyPr rtlCol="0" anchor="ctr"/>
+                <a:lstStyle/>
+                <a:p>
+                  <a:pPr algn="ctr"/>
+                  <a:endParaRPr lang="en-US"/>
+                </a:p>
+              </p:txBody>
+            </p:sp>
+            <p:sp>
+              <p:nvSpPr>
+                <p:cNvPr id="6" name="Rectangle 5"/>
+                <p:cNvSpPr/>
+                <p:nvPr/>
+              </p:nvSpPr>
+              <p:spPr>
+                <a:xfrm>
+                  <a:off x="728207" y="3600451"/>
+                  <a:ext cx="2447925" cy="156211"/>
+                </a:xfrm>
+                <a:prstGeom prst="rect">
+                  <a:avLst/>
+                </a:prstGeom>
+                <a:solidFill>
+                  <a:schemeClr val="accent4">
+                    <a:lumMod val="50000"/>
+                  </a:schemeClr>
+                </a:solidFill>
+                <a:ln>
+                  <a:noFill/>
+                </a:ln>
+              </p:spPr>
+              <p:style>
+                <a:lnRef idx="2">
+                  <a:schemeClr val="accent1">
+                    <a:shade val="50000"/>
+                  </a:schemeClr>
+                </a:lnRef>
+                <a:fillRef idx="1">
+                  <a:schemeClr val="accent1"/>
+                </a:fillRef>
+                <a:effectRef idx="0">
+                  <a:schemeClr val="accent1"/>
+                </a:effectRef>
+                <a:fontRef idx="minor">
+                  <a:schemeClr val="lt1"/>
+                </a:fontRef>
+              </p:style>
+              <p:txBody>
+                <a:bodyPr rtlCol="0" anchor="ctr"/>
+                <a:lstStyle/>
+                <a:p>
+                  <a:pPr algn="ctr"/>
+                  <a:endParaRPr lang="en-US"/>
+                </a:p>
+              </p:txBody>
+            </p:sp>
+          </p:grpSp>
+          <p:cxnSp>
+            <p:nvCxnSpPr>
+              <p:cNvPr id="9" name="Straight Arrow Connector 8"/>
+              <p:cNvCxnSpPr/>
+              <p:nvPr/>
+            </p:nvCxnSpPr>
+            <p:spPr>
+              <a:xfrm>
+                <a:off x="3176410" y="1860006"/>
+                <a:ext cx="366890" cy="0"/>
+              </a:xfrm>
+              <a:prstGeom prst="straightConnector1">
+                <a:avLst/>
+              </a:prstGeom>
+              <a:ln>
+                <a:solidFill>
+                  <a:schemeClr val="tx1"/>
+                </a:solidFill>
+                <a:tailEnd type="triangle"/>
+              </a:ln>
+            </p:spPr>
+            <p:style>
+              <a:lnRef idx="1">
+                <a:schemeClr val="accent1"/>
+              </a:lnRef>
+              <a:fillRef idx="0">
+                <a:schemeClr val="accent1"/>
+              </a:fillRef>
+              <a:effectRef idx="0">
+                <a:schemeClr val="accent1"/>
+              </a:effectRef>
+              <a:fontRef idx="minor">
+                <a:schemeClr val="tx1"/>
+              </a:fontRef>
+            </p:style>
+          </p:cxnSp>
+          <p:sp>
+            <p:nvSpPr>
+              <p:cNvPr id="10" name="TextBox 9"/>
+              <p:cNvSpPr txBox="1"/>
+              <p:nvPr/>
+            </p:nvSpPr>
+            <p:spPr>
+              <a:xfrm>
+                <a:off x="3543300" y="1729201"/>
+                <a:ext cx="444847" cy="276999"/>
+              </a:xfrm>
+              <a:prstGeom prst="rect">
+                <a:avLst/>
+              </a:prstGeom>
+              <a:noFill/>
+            </p:spPr>
+            <p:txBody>
+              <a:bodyPr wrap="square" rtlCol="0">
+                <a:spAutoFit/>
+              </a:bodyPr>
+              <a:lstStyle/>
+              <a:p>
+                <a:r>
+                  <a:rPr lang="en-US" altLang="zh-CN" sz="1200" dirty="0" err="1" smtClean="0"/>
+                  <a:t>InGaAs</a:t>
+                </a:r>
+                <a:endParaRPr lang="en-US" sz="1200" dirty="0"/>
+              </a:p>
+            </p:txBody>
+          </p:sp>
+          <p:sp>
+            <p:nvSpPr>
+              <p:cNvPr id="11" name="TextBox 10"/>
+              <p:cNvSpPr txBox="1"/>
+              <p:nvPr/>
+            </p:nvSpPr>
+            <p:spPr>
+              <a:xfrm>
+                <a:off x="3543300" y="2186401"/>
+                <a:ext cx="334630" cy="276999"/>
+              </a:xfrm>
+              <a:prstGeom prst="rect">
+                <a:avLst/>
+              </a:prstGeom>
+              <a:noFill/>
+            </p:spPr>
+            <p:txBody>
+              <a:bodyPr wrap="square" rtlCol="0">
+                <a:spAutoFit/>
+              </a:bodyPr>
+              <a:lstStyle/>
+              <a:p>
+                <a:r>
+                  <a:rPr lang="en-US" altLang="zh-CN" sz="1200" dirty="0" smtClean="0"/>
+                  <a:t>p-</a:t>
+                </a:r>
+                <a:r>
+                  <a:rPr lang="en-US" altLang="zh-CN" sz="1200" dirty="0" err="1" smtClean="0"/>
+                  <a:t>InP</a:t>
+                </a:r>
+                <a:endParaRPr lang="en-US" sz="1200" dirty="0"/>
+              </a:p>
+            </p:txBody>
+          </p:sp>
+          <p:cxnSp>
+            <p:nvCxnSpPr>
+              <p:cNvPr id="12" name="Straight Arrow Connector 11"/>
+              <p:cNvCxnSpPr/>
+              <p:nvPr/>
+            </p:nvCxnSpPr>
+            <p:spPr>
+              <a:xfrm>
+                <a:off x="3176410" y="2317206"/>
+                <a:ext cx="366890" cy="0"/>
+              </a:xfrm>
+              <a:prstGeom prst="straightConnector1">
+                <a:avLst/>
+              </a:prstGeom>
+              <a:ln>
+                <a:solidFill>
+                  <a:schemeClr val="tx1"/>
+                </a:solidFill>
+                <a:tailEnd type="triangle"/>
+              </a:ln>
+            </p:spPr>
+            <p:style>
+              <a:lnRef idx="1">
+                <a:schemeClr val="accent1"/>
+              </a:lnRef>
+              <a:fillRef idx="0">
+                <a:schemeClr val="accent1"/>
+              </a:fillRef>
+              <a:effectRef idx="0">
+                <a:schemeClr val="accent1"/>
+              </a:effectRef>
+              <a:fontRef idx="minor">
+                <a:schemeClr val="tx1"/>
+              </a:fontRef>
+            </p:style>
+          </p:cxnSp>
+          <p:cxnSp>
+            <p:nvCxnSpPr>
+              <p:cNvPr id="13" name="Straight Arrow Connector 12"/>
+              <p:cNvCxnSpPr/>
+              <p:nvPr/>
+            </p:nvCxnSpPr>
+            <p:spPr>
+              <a:xfrm>
+                <a:off x="3176410" y="3231606"/>
+                <a:ext cx="366890" cy="0"/>
+              </a:xfrm>
+              <a:prstGeom prst="straightConnector1">
+                <a:avLst/>
+              </a:prstGeom>
+              <a:ln>
+                <a:solidFill>
+                  <a:schemeClr val="tx1"/>
+                </a:solidFill>
+                <a:tailEnd type="triangle"/>
+              </a:ln>
+            </p:spPr>
+            <p:style>
+              <a:lnRef idx="1">
+                <a:schemeClr val="accent1"/>
+              </a:lnRef>
+              <a:fillRef idx="0">
+                <a:schemeClr val="accent1"/>
+              </a:fillRef>
+              <a:effectRef idx="0">
+                <a:schemeClr val="accent1"/>
+              </a:effectRef>
+              <a:fontRef idx="minor">
+                <a:schemeClr val="tx1"/>
+              </a:fontRef>
+            </p:style>
+          </p:cxnSp>
+          <p:cxnSp>
+            <p:nvCxnSpPr>
+              <p:cNvPr id="14" name="Straight Arrow Connector 13"/>
+              <p:cNvCxnSpPr/>
+              <p:nvPr/>
+            </p:nvCxnSpPr>
+            <p:spPr>
+              <a:xfrm>
+                <a:off x="3176410" y="3558540"/>
+                <a:ext cx="366890" cy="0"/>
+              </a:xfrm>
+              <a:prstGeom prst="straightConnector1">
+                <a:avLst/>
+              </a:prstGeom>
+              <a:ln>
+                <a:solidFill>
+                  <a:schemeClr val="tx1"/>
+                </a:solidFill>
+                <a:tailEnd type="triangle"/>
+              </a:ln>
+            </p:spPr>
+            <p:style>
+              <a:lnRef idx="1">
+                <a:schemeClr val="accent1"/>
+              </a:lnRef>
+              <a:fillRef idx="0">
+                <a:schemeClr val="accent1"/>
+              </a:fillRef>
+              <a:effectRef idx="0">
+                <a:schemeClr val="accent1"/>
+              </a:effectRef>
+              <a:fontRef idx="minor">
+                <a:schemeClr val="tx1"/>
+              </a:fontRef>
+            </p:style>
+          </p:cxnSp>
+          <p:sp>
+            <p:nvSpPr>
+              <p:cNvPr id="15" name="TextBox 14"/>
+              <p:cNvSpPr txBox="1"/>
+              <p:nvPr/>
+            </p:nvSpPr>
+            <p:spPr>
+              <a:xfrm>
+                <a:off x="3543300" y="3065017"/>
+                <a:ext cx="393651" cy="276999"/>
+              </a:xfrm>
+              <a:prstGeom prst="rect">
+                <a:avLst/>
+              </a:prstGeom>
+              <a:noFill/>
+            </p:spPr>
+            <p:txBody>
+              <a:bodyPr wrap="square" rtlCol="0">
+                <a:spAutoFit/>
+              </a:bodyPr>
+              <a:lstStyle/>
+              <a:p>
+                <a:r>
+                  <a:rPr lang="en-US" altLang="zh-CN" sz="1200" dirty="0" smtClean="0"/>
+                  <a:t>SCH</a:t>
+                </a:r>
+                <a:endParaRPr lang="en-US" sz="1200" dirty="0"/>
+              </a:p>
+            </p:txBody>
+          </p:sp>
+          <p:sp>
+            <p:nvSpPr>
+              <p:cNvPr id="16" name="TextBox 15"/>
+              <p:cNvSpPr txBox="1"/>
+              <p:nvPr/>
+            </p:nvSpPr>
+            <p:spPr>
+              <a:xfrm>
+                <a:off x="3543300" y="3420041"/>
+                <a:ext cx="366890" cy="276999"/>
+              </a:xfrm>
+              <a:prstGeom prst="rect">
+                <a:avLst/>
+              </a:prstGeom>
+              <a:noFill/>
+            </p:spPr>
+            <p:txBody>
+              <a:bodyPr wrap="square" rtlCol="0">
+                <a:spAutoFit/>
+              </a:bodyPr>
+              <a:lstStyle/>
+              <a:p>
+                <a:r>
+                  <a:rPr lang="en-US" altLang="zh-CN" sz="1200" dirty="0" smtClean="0"/>
+                  <a:t>SCH</a:t>
+                </a:r>
+                <a:endParaRPr lang="en-US" sz="1200" dirty="0"/>
+              </a:p>
+            </p:txBody>
+          </p:sp>
+          <p:cxnSp>
+            <p:nvCxnSpPr>
+              <p:cNvPr id="17" name="Straight Arrow Connector 16"/>
+              <p:cNvCxnSpPr/>
+              <p:nvPr/>
+            </p:nvCxnSpPr>
+            <p:spPr>
+              <a:xfrm>
+                <a:off x="3176410" y="3376952"/>
+                <a:ext cx="366890" cy="0"/>
+              </a:xfrm>
+              <a:prstGeom prst="straightConnector1">
+                <a:avLst/>
+              </a:prstGeom>
+              <a:ln>
+                <a:solidFill>
+                  <a:schemeClr val="tx1"/>
+                </a:solidFill>
+                <a:tailEnd type="triangle"/>
+              </a:ln>
+            </p:spPr>
+            <p:style>
+              <a:lnRef idx="1">
+                <a:schemeClr val="accent1"/>
+              </a:lnRef>
+              <a:fillRef idx="0">
+                <a:schemeClr val="accent1"/>
+              </a:fillRef>
+              <a:effectRef idx="0">
+                <a:schemeClr val="accent1"/>
+              </a:effectRef>
+              <a:fontRef idx="minor">
+                <a:schemeClr val="tx1"/>
+              </a:fontRef>
+            </p:style>
+          </p:cxnSp>
+          <p:sp>
+            <p:nvSpPr>
+              <p:cNvPr id="18" name="TextBox 17"/>
+              <p:cNvSpPr txBox="1"/>
+              <p:nvPr/>
+            </p:nvSpPr>
+            <p:spPr>
+              <a:xfrm>
+                <a:off x="3543300" y="3259696"/>
+                <a:ext cx="393651" cy="276999"/>
+              </a:xfrm>
+              <a:prstGeom prst="rect">
+                <a:avLst/>
+              </a:prstGeom>
+              <a:noFill/>
+            </p:spPr>
+            <p:txBody>
+              <a:bodyPr wrap="square" rtlCol="0">
+                <a:spAutoFit/>
+              </a:bodyPr>
+              <a:lstStyle/>
+              <a:p>
+                <a:r>
+                  <a:rPr lang="en-US" altLang="zh-CN" sz="1200" dirty="0" smtClean="0"/>
+                  <a:t>MQW</a:t>
+                </a:r>
+                <a:endParaRPr lang="en-US" sz="1200" dirty="0"/>
+              </a:p>
+            </p:txBody>
+          </p:sp>
+          <p:cxnSp>
+            <p:nvCxnSpPr>
+              <p:cNvPr id="19" name="Straight Arrow Connector 18"/>
+              <p:cNvCxnSpPr/>
+              <p:nvPr/>
+            </p:nvCxnSpPr>
+            <p:spPr>
+              <a:xfrm>
+                <a:off x="3176410" y="3683705"/>
+                <a:ext cx="366890" cy="0"/>
+              </a:xfrm>
+              <a:prstGeom prst="straightConnector1">
+                <a:avLst/>
+              </a:prstGeom>
+              <a:ln>
+                <a:solidFill>
+                  <a:schemeClr val="tx1"/>
+                </a:solidFill>
+                <a:tailEnd type="triangle"/>
+              </a:ln>
+            </p:spPr>
+            <p:style>
+              <a:lnRef idx="1">
+                <a:schemeClr val="accent1"/>
+              </a:lnRef>
+              <a:fillRef idx="0">
+                <a:schemeClr val="accent1"/>
+              </a:fillRef>
+              <a:effectRef idx="0">
+                <a:schemeClr val="accent1"/>
+              </a:effectRef>
+              <a:fontRef idx="minor">
+                <a:schemeClr val="tx1"/>
+              </a:fontRef>
+            </p:style>
+          </p:cxnSp>
+          <p:sp>
+            <p:nvSpPr>
+              <p:cNvPr id="20" name="TextBox 19"/>
+              <p:cNvSpPr txBox="1"/>
+              <p:nvPr/>
+            </p:nvSpPr>
+            <p:spPr>
+              <a:xfrm>
+                <a:off x="3543300" y="3562639"/>
+                <a:ext cx="334630" cy="276999"/>
+              </a:xfrm>
+              <a:prstGeom prst="rect">
+                <a:avLst/>
+              </a:prstGeom>
+              <a:noFill/>
+            </p:spPr>
+            <p:txBody>
+              <a:bodyPr wrap="square" rtlCol="0">
+                <a:spAutoFit/>
+              </a:bodyPr>
+              <a:lstStyle/>
+              <a:p>
+                <a:r>
+                  <a:rPr lang="en-US" sz="1200" dirty="0" smtClean="0"/>
+                  <a:t>n-</a:t>
+                </a:r>
+                <a:r>
+                  <a:rPr lang="en-US" sz="1200" dirty="0" err="1" smtClean="0"/>
+                  <a:t>InP</a:t>
+                </a:r>
+                <a:endParaRPr lang="en-US" sz="1200" dirty="0"/>
+              </a:p>
+            </p:txBody>
+          </p:sp>
+        </p:grpSp>
+        <p:grpSp>
+          <p:nvGrpSpPr>
+            <p:cNvPr id="49" name="Group 48"/>
+            <p:cNvGrpSpPr/>
+            <p:nvPr/>
+          </p:nvGrpSpPr>
+          <p:grpSpPr>
+            <a:xfrm>
+              <a:off x="3667125" y="3500548"/>
+              <a:ext cx="4499489" cy="2465741"/>
+              <a:chOff x="4555454" y="1775284"/>
+              <a:chExt cx="4499489" cy="2465741"/>
+            </a:xfrm>
+          </p:grpSpPr>
+          <p:grpSp>
+            <p:nvGrpSpPr>
+              <p:cNvPr id="46" name="Group 45"/>
+              <p:cNvGrpSpPr/>
+              <p:nvPr/>
+            </p:nvGrpSpPr>
+            <p:grpSpPr>
+              <a:xfrm>
+                <a:off x="4705984" y="2158224"/>
+                <a:ext cx="4257041" cy="2017537"/>
+                <a:chOff x="4340225" y="2329544"/>
+                <a:chExt cx="3350222" cy="2447352"/>
+              </a:xfrm>
+            </p:grpSpPr>
+            <p:pic>
+              <p:nvPicPr>
+                <p:cNvPr id="45" name="Picture 44"/>
+                <p:cNvPicPr>
+                  <a:picLocks noChangeAspect="1"/>
+                </p:cNvPicPr>
+                <p:nvPr/>
+              </p:nvPicPr>
+              <p:blipFill>
+                <a:blip r:embed="rId3"/>
+                <a:stretch>
+                  <a:fillRect/>
+                </a:stretch>
+              </p:blipFill>
+              <p:spPr>
+                <a:xfrm>
+                  <a:off x="4340225" y="2329544"/>
+                  <a:ext cx="3350222" cy="2447352"/>
+                </a:xfrm>
+                <a:prstGeom prst="rect">
+                  <a:avLst/>
+                </a:prstGeom>
+              </p:spPr>
+            </p:pic>
+            <p:sp>
+              <p:nvSpPr>
+                <p:cNvPr id="23" name="Rectangle 22"/>
+                <p:cNvSpPr/>
+                <p:nvPr/>
+              </p:nvSpPr>
+              <p:spPr>
+                <a:xfrm>
+                  <a:off x="6024309" y="2345236"/>
+                  <a:ext cx="1666138" cy="375824"/>
+                </a:xfrm>
+                <a:prstGeom prst="rect">
+                  <a:avLst/>
+                </a:prstGeom>
+                <a:solidFill>
+                  <a:schemeClr val="bg1"/>
+                </a:solidFill>
+                <a:ln>
+                  <a:solidFill>
+                    <a:schemeClr val="bg1"/>
+                  </a:solidFill>
+                </a:ln>
+              </p:spPr>
+              <p:style>
+                <a:lnRef idx="2">
+                  <a:schemeClr val="accent1">
+                    <a:shade val="50000"/>
+                  </a:schemeClr>
+                </a:lnRef>
+                <a:fillRef idx="1">
+                  <a:schemeClr val="accent1"/>
+                </a:fillRef>
+                <a:effectRef idx="0">
+                  <a:schemeClr val="accent1"/>
+                </a:effectRef>
+                <a:fontRef idx="minor">
+                  <a:schemeClr val="lt1"/>
+                </a:fontRef>
+              </p:style>
+              <p:txBody>
+                <a:bodyPr rtlCol="0" anchor="ctr"/>
+                <a:lstStyle/>
+                <a:p>
+                  <a:pPr algn="ctr"/>
+                  <a:endParaRPr lang="en-US"/>
+                </a:p>
+              </p:txBody>
+            </p:sp>
+          </p:grpSp>
+          <p:grpSp>
+            <p:nvGrpSpPr>
+              <p:cNvPr id="30" name="Group 29"/>
+              <p:cNvGrpSpPr/>
+              <p:nvPr/>
+            </p:nvGrpSpPr>
+            <p:grpSpPr>
+              <a:xfrm>
+                <a:off x="4880750" y="3964026"/>
+                <a:ext cx="2247900" cy="276999"/>
+                <a:chOff x="4857750" y="3839141"/>
+                <a:chExt cx="2247900" cy="276999"/>
+              </a:xfrm>
+            </p:grpSpPr>
+            <p:cxnSp>
+              <p:nvCxnSpPr>
+                <p:cNvPr id="27" name="Straight Connector 26"/>
+                <p:cNvCxnSpPr/>
+                <p:nvPr/>
+              </p:nvCxnSpPr>
+              <p:spPr>
+                <a:xfrm>
+                  <a:off x="4857750" y="3977640"/>
+                  <a:ext cx="404656" cy="0"/>
+                </a:xfrm>
+                <a:prstGeom prst="line">
+                  <a:avLst/>
+                </a:prstGeom>
+                <a:ln>
+                  <a:solidFill>
+                    <a:srgbClr val="00B050"/>
+                  </a:solidFill>
+                </a:ln>
+              </p:spPr>
+              <p:style>
+                <a:lnRef idx="1">
+                  <a:schemeClr val="accent1"/>
+                </a:lnRef>
+                <a:fillRef idx="0">
+                  <a:schemeClr val="accent1"/>
+                </a:fillRef>
+                <a:effectRef idx="0">
+                  <a:schemeClr val="accent1"/>
+                </a:effectRef>
+                <a:fontRef idx="minor">
+                  <a:schemeClr val="tx1"/>
+                </a:fontRef>
+              </p:style>
+            </p:cxnSp>
+            <p:sp>
+              <p:nvSpPr>
+                <p:cNvPr id="28" name="TextBox 27"/>
+                <p:cNvSpPr txBox="1"/>
+                <p:nvPr/>
+              </p:nvSpPr>
+              <p:spPr>
+                <a:xfrm>
+                  <a:off x="5262405" y="3839141"/>
+                  <a:ext cx="1843245" cy="276999"/>
+                </a:xfrm>
+                <a:prstGeom prst="rect">
+                  <a:avLst/>
+                </a:prstGeom>
+                <a:noFill/>
+              </p:spPr>
+              <p:txBody>
+                <a:bodyPr wrap="square" rtlCol="0">
+                  <a:spAutoFit/>
+                </a:bodyPr>
+                <a:lstStyle/>
+                <a:p>
+                  <a:r>
+                    <a:rPr lang="en-US" altLang="zh-CN" sz="1200" dirty="0" smtClean="0"/>
+                    <a:t>Valence Band Energy (eV)</a:t>
+                  </a:r>
+                  <a:endParaRPr lang="en-US" sz="1200" dirty="0"/>
+                </a:p>
+              </p:txBody>
+            </p:sp>
+          </p:grpSp>
+          <p:grpSp>
+            <p:nvGrpSpPr>
+              <p:cNvPr id="31" name="Group 30"/>
+              <p:cNvGrpSpPr/>
+              <p:nvPr/>
+            </p:nvGrpSpPr>
+            <p:grpSpPr>
+              <a:xfrm>
+                <a:off x="4880750" y="3740527"/>
+                <a:ext cx="2562225" cy="276999"/>
+                <a:chOff x="4857750" y="3689718"/>
+                <a:chExt cx="2562225" cy="276999"/>
+              </a:xfrm>
+            </p:grpSpPr>
+            <p:cxnSp>
+              <p:nvCxnSpPr>
+                <p:cNvPr id="26" name="Straight Connector 25"/>
+                <p:cNvCxnSpPr/>
+                <p:nvPr/>
+              </p:nvCxnSpPr>
+              <p:spPr>
+                <a:xfrm>
+                  <a:off x="4857750" y="3817295"/>
+                  <a:ext cx="404656" cy="0"/>
+                </a:xfrm>
+                <a:prstGeom prst="line">
+                  <a:avLst/>
+                </a:prstGeom>
+                <a:ln>
+                  <a:solidFill>
+                    <a:srgbClr val="FF0000"/>
+                  </a:solidFill>
+                </a:ln>
+              </p:spPr>
+              <p:style>
+                <a:lnRef idx="1">
+                  <a:schemeClr val="accent1"/>
+                </a:lnRef>
+                <a:fillRef idx="0">
+                  <a:schemeClr val="accent1"/>
+                </a:fillRef>
+                <a:effectRef idx="0">
+                  <a:schemeClr val="accent1"/>
+                </a:effectRef>
+                <a:fontRef idx="minor">
+                  <a:schemeClr val="tx1"/>
+                </a:fontRef>
+              </p:style>
+            </p:cxnSp>
+            <p:sp>
+              <p:nvSpPr>
+                <p:cNvPr id="29" name="TextBox 28"/>
+                <p:cNvSpPr txBox="1"/>
+                <p:nvPr/>
+              </p:nvSpPr>
+              <p:spPr>
+                <a:xfrm>
+                  <a:off x="5253535" y="3689718"/>
+                  <a:ext cx="2166440" cy="276999"/>
+                </a:xfrm>
+                <a:prstGeom prst="rect">
+                  <a:avLst/>
+                </a:prstGeom>
+                <a:noFill/>
+              </p:spPr>
+              <p:txBody>
+                <a:bodyPr wrap="square" rtlCol="0">
+                  <a:spAutoFit/>
+                </a:bodyPr>
+                <a:lstStyle/>
+                <a:p>
+                  <a:r>
+                    <a:rPr lang="en-US" altLang="zh-CN" sz="1200" dirty="0" smtClean="0"/>
+                    <a:t>Conduction Band Energy (eV)</a:t>
+                  </a:r>
+                  <a:endParaRPr lang="en-US" sz="1200" dirty="0"/>
+                </a:p>
+              </p:txBody>
+            </p:sp>
+          </p:grpSp>
+          <p:sp>
+            <p:nvSpPr>
+              <p:cNvPr id="34" name="Left Brace 33"/>
+              <p:cNvSpPr/>
+              <p:nvPr/>
+            </p:nvSpPr>
+            <p:spPr>
+              <a:xfrm rot="5400000">
+                <a:off x="5610373" y="1631013"/>
+                <a:ext cx="182922" cy="1132980"/>
+              </a:xfrm>
+              <a:prstGeom prst="leftBrace">
+                <a:avLst/>
+              </a:prstGeom>
+              <a:ln>
+                <a:solidFill>
+                  <a:schemeClr val="tx1"/>
+                </a:solidFill>
+              </a:ln>
+            </p:spPr>
+            <p:style>
+              <a:lnRef idx="1">
+                <a:schemeClr val="accent1"/>
+              </a:lnRef>
+              <a:fillRef idx="0">
+                <a:schemeClr val="accent1"/>
+              </a:fillRef>
+              <a:effectRef idx="0">
+                <a:schemeClr val="accent1"/>
+              </a:effectRef>
+              <a:fontRef idx="minor">
+                <a:schemeClr val="tx1"/>
+              </a:fontRef>
+            </p:style>
+            <p:txBody>
+              <a:bodyPr rtlCol="0" anchor="ctr"/>
+              <a:lstStyle/>
+              <a:p>
+                <a:pPr algn="ctr"/>
+                <a:endParaRPr lang="en-US"/>
+              </a:p>
+            </p:txBody>
+          </p:sp>
+          <p:sp>
+            <p:nvSpPr>
+              <p:cNvPr id="35" name="TextBox 34"/>
+              <p:cNvSpPr txBox="1"/>
+              <p:nvPr/>
+            </p:nvSpPr>
+            <p:spPr>
+              <a:xfrm>
+                <a:off x="5307549" y="1775284"/>
+                <a:ext cx="716936" cy="276999"/>
+              </a:xfrm>
+              <a:prstGeom prst="rect">
+                <a:avLst/>
+              </a:prstGeom>
+              <a:noFill/>
+            </p:spPr>
+            <p:txBody>
+              <a:bodyPr wrap="square" rtlCol="0">
+                <a:spAutoFit/>
+              </a:bodyPr>
+              <a:lstStyle/>
+              <a:p>
+                <a:pPr algn="ctr"/>
+                <a:r>
+                  <a:rPr lang="en-US" altLang="zh-CN" sz="1200" dirty="0" smtClean="0"/>
+                  <a:t>p-</a:t>
+                </a:r>
+                <a:r>
+                  <a:rPr lang="en-US" altLang="zh-CN" sz="1200" dirty="0" err="1" smtClean="0"/>
+                  <a:t>InP</a:t>
+                </a:r>
+                <a:endParaRPr lang="en-US" sz="1200" dirty="0"/>
+              </a:p>
+            </p:txBody>
+          </p:sp>
+          <p:sp>
+            <p:nvSpPr>
+              <p:cNvPr id="36" name="Left Brace 35"/>
+              <p:cNvSpPr/>
+              <p:nvPr/>
+            </p:nvSpPr>
+            <p:spPr>
+              <a:xfrm rot="5400000">
+                <a:off x="6565136" y="1817881"/>
+                <a:ext cx="160883" cy="737205"/>
+              </a:xfrm>
+              <a:prstGeom prst="leftBrace">
+                <a:avLst/>
+              </a:prstGeom>
+              <a:ln>
+                <a:solidFill>
+                  <a:schemeClr val="tx1"/>
+                </a:solidFill>
+              </a:ln>
+            </p:spPr>
+            <p:style>
+              <a:lnRef idx="1">
+                <a:schemeClr val="accent1"/>
+              </a:lnRef>
+              <a:fillRef idx="0">
+                <a:schemeClr val="accent1"/>
+              </a:fillRef>
+              <a:effectRef idx="0">
+                <a:schemeClr val="accent1"/>
+              </a:effectRef>
+              <a:fontRef idx="minor">
+                <a:schemeClr val="tx1"/>
+              </a:fontRef>
+            </p:style>
+            <p:txBody>
+              <a:bodyPr rtlCol="0" anchor="ctr"/>
+              <a:lstStyle/>
+              <a:p>
+                <a:pPr algn="ctr"/>
+                <a:endParaRPr lang="en-US"/>
+              </a:p>
+            </p:txBody>
+          </p:sp>
+          <p:sp>
+            <p:nvSpPr>
+              <p:cNvPr id="37" name="TextBox 36"/>
+              <p:cNvSpPr txBox="1"/>
+              <p:nvPr/>
+            </p:nvSpPr>
+            <p:spPr>
+              <a:xfrm>
+                <a:off x="6241613" y="1775284"/>
+                <a:ext cx="716936" cy="276999"/>
+              </a:xfrm>
+              <a:prstGeom prst="rect">
+                <a:avLst/>
+              </a:prstGeom>
+              <a:noFill/>
+            </p:spPr>
+            <p:txBody>
+              <a:bodyPr wrap="square" rtlCol="0">
+                <a:spAutoFit/>
+              </a:bodyPr>
+              <a:lstStyle/>
+              <a:p>
+                <a:pPr algn="ctr"/>
+                <a:r>
+                  <a:rPr lang="en-US" altLang="zh-CN" sz="1200" dirty="0" smtClean="0"/>
+                  <a:t>SCH</a:t>
+                </a:r>
+                <a:endParaRPr lang="en-US" sz="1200" dirty="0"/>
+              </a:p>
+            </p:txBody>
+          </p:sp>
+          <p:sp>
+            <p:nvSpPr>
+              <p:cNvPr id="38" name="Left Brace 37"/>
+              <p:cNvSpPr/>
+              <p:nvPr/>
+            </p:nvSpPr>
+            <p:spPr>
+              <a:xfrm rot="5400000">
+                <a:off x="7349839" y="1766603"/>
+                <a:ext cx="169740" cy="848619"/>
+              </a:xfrm>
+              <a:prstGeom prst="leftBrace">
+                <a:avLst/>
+              </a:prstGeom>
+              <a:ln>
+                <a:solidFill>
+                  <a:schemeClr val="tx1"/>
+                </a:solidFill>
+              </a:ln>
+            </p:spPr>
+            <p:style>
+              <a:lnRef idx="1">
+                <a:schemeClr val="accent1"/>
+              </a:lnRef>
+              <a:fillRef idx="0">
+                <a:schemeClr val="accent1"/>
+              </a:fillRef>
+              <a:effectRef idx="0">
+                <a:schemeClr val="accent1"/>
+              </a:effectRef>
+              <a:fontRef idx="minor">
+                <a:schemeClr val="tx1"/>
+              </a:fontRef>
+            </p:style>
+            <p:txBody>
+              <a:bodyPr rtlCol="0" anchor="ctr"/>
+              <a:lstStyle/>
+              <a:p>
+                <a:pPr algn="ctr"/>
+                <a:endParaRPr lang="en-US"/>
+              </a:p>
+            </p:txBody>
+          </p:sp>
+          <p:sp>
+            <p:nvSpPr>
+              <p:cNvPr id="39" name="TextBox 38"/>
+              <p:cNvSpPr txBox="1"/>
+              <p:nvPr/>
+            </p:nvSpPr>
+            <p:spPr>
+              <a:xfrm>
+                <a:off x="7095280" y="1775284"/>
+                <a:ext cx="716936" cy="276999"/>
+              </a:xfrm>
+              <a:prstGeom prst="rect">
+                <a:avLst/>
+              </a:prstGeom>
+              <a:noFill/>
+            </p:spPr>
+            <p:txBody>
+              <a:bodyPr wrap="square" rtlCol="0">
+                <a:spAutoFit/>
+              </a:bodyPr>
+              <a:lstStyle/>
+              <a:p>
+                <a:pPr algn="ctr"/>
+                <a:r>
+                  <a:rPr lang="en-US" altLang="zh-CN" sz="1200" dirty="0" smtClean="0"/>
+                  <a:t>MQW</a:t>
+                </a:r>
+                <a:endParaRPr lang="en-US" sz="1200" dirty="0"/>
+              </a:p>
+            </p:txBody>
+          </p:sp>
+          <p:sp>
+            <p:nvSpPr>
+              <p:cNvPr id="40" name="Left Brace 39"/>
+              <p:cNvSpPr/>
+              <p:nvPr/>
+            </p:nvSpPr>
+            <p:spPr>
+              <a:xfrm rot="5400000">
+                <a:off x="8055473" y="1926891"/>
+                <a:ext cx="180655" cy="538958"/>
+              </a:xfrm>
+              <a:prstGeom prst="leftBrace">
+                <a:avLst/>
+              </a:prstGeom>
+              <a:ln>
+                <a:solidFill>
+                  <a:schemeClr val="tx1"/>
+                </a:solidFill>
+              </a:ln>
+            </p:spPr>
+            <p:style>
+              <a:lnRef idx="1">
+                <a:schemeClr val="accent1"/>
+              </a:lnRef>
+              <a:fillRef idx="0">
+                <a:schemeClr val="accent1"/>
+              </a:fillRef>
+              <a:effectRef idx="0">
+                <a:schemeClr val="accent1"/>
+              </a:effectRef>
+              <a:fontRef idx="minor">
+                <a:schemeClr val="tx1"/>
+              </a:fontRef>
+            </p:style>
+            <p:txBody>
+              <a:bodyPr rtlCol="0" anchor="ctr"/>
+              <a:lstStyle/>
+              <a:p>
+                <a:pPr algn="ctr"/>
+                <a:endParaRPr lang="en-US"/>
+              </a:p>
+            </p:txBody>
+          </p:sp>
+          <p:sp>
+            <p:nvSpPr>
+              <p:cNvPr id="41" name="TextBox 40"/>
+              <p:cNvSpPr txBox="1"/>
+              <p:nvPr/>
+            </p:nvSpPr>
+            <p:spPr>
+              <a:xfrm>
+                <a:off x="7787332" y="1775284"/>
+                <a:ext cx="716936" cy="276999"/>
+              </a:xfrm>
+              <a:prstGeom prst="rect">
+                <a:avLst/>
+              </a:prstGeom>
+              <a:noFill/>
+            </p:spPr>
+            <p:txBody>
+              <a:bodyPr wrap="square" rtlCol="0">
+                <a:spAutoFit/>
+              </a:bodyPr>
+              <a:lstStyle/>
+              <a:p>
+                <a:pPr algn="ctr"/>
+                <a:r>
+                  <a:rPr lang="en-US" altLang="zh-CN" sz="1200" dirty="0" smtClean="0"/>
+                  <a:t>SCH</a:t>
+                </a:r>
+                <a:endParaRPr lang="en-US" sz="1200" dirty="0"/>
+              </a:p>
+            </p:txBody>
+          </p:sp>
+          <p:sp>
+            <p:nvSpPr>
+              <p:cNvPr id="42" name="Left Brace 41"/>
+              <p:cNvSpPr/>
+              <p:nvPr/>
+            </p:nvSpPr>
+            <p:spPr>
+              <a:xfrm rot="5400000">
+                <a:off x="8606149" y="1932475"/>
+                <a:ext cx="180653" cy="527787"/>
+              </a:xfrm>
+              <a:prstGeom prst="leftBrace">
+                <a:avLst/>
+              </a:prstGeom>
+              <a:ln>
+                <a:solidFill>
+                  <a:schemeClr val="tx1"/>
+                </a:solidFill>
+              </a:ln>
+            </p:spPr>
+            <p:style>
+              <a:lnRef idx="1">
+                <a:schemeClr val="accent1"/>
+              </a:lnRef>
+              <a:fillRef idx="0">
+                <a:schemeClr val="accent1"/>
+              </a:fillRef>
+              <a:effectRef idx="0">
+                <a:schemeClr val="accent1"/>
+              </a:effectRef>
+              <a:fontRef idx="minor">
+                <a:schemeClr val="tx1"/>
+              </a:fontRef>
+            </p:style>
+            <p:txBody>
+              <a:bodyPr rtlCol="0" anchor="ctr"/>
+              <a:lstStyle/>
+              <a:p>
+                <a:pPr algn="ctr"/>
+                <a:endParaRPr lang="en-US"/>
+              </a:p>
+            </p:txBody>
+          </p:sp>
+          <p:sp>
+            <p:nvSpPr>
+              <p:cNvPr id="43" name="TextBox 42"/>
+              <p:cNvSpPr txBox="1"/>
+              <p:nvPr/>
+            </p:nvSpPr>
+            <p:spPr>
+              <a:xfrm>
+                <a:off x="8338007" y="1775284"/>
+                <a:ext cx="716936" cy="276999"/>
+              </a:xfrm>
+              <a:prstGeom prst="rect">
+                <a:avLst/>
+              </a:prstGeom>
+              <a:noFill/>
+            </p:spPr>
+            <p:txBody>
+              <a:bodyPr wrap="square" rtlCol="0">
+                <a:spAutoFit/>
+              </a:bodyPr>
+              <a:lstStyle/>
+              <a:p>
+                <a:pPr algn="ctr"/>
+                <a:r>
+                  <a:rPr lang="en-US" altLang="zh-CN" sz="1200" dirty="0" smtClean="0"/>
+                  <a:t>n-</a:t>
+                </a:r>
+                <a:r>
+                  <a:rPr lang="en-US" altLang="zh-CN" sz="1200" dirty="0" err="1" smtClean="0"/>
+                  <a:t>InP</a:t>
+                </a:r>
+                <a:endParaRPr lang="en-US" sz="1200" dirty="0"/>
+              </a:p>
+            </p:txBody>
+          </p:sp>
+          <p:sp>
+            <p:nvSpPr>
+              <p:cNvPr id="47" name="Left Brace 46"/>
+              <p:cNvSpPr/>
+              <p:nvPr/>
+            </p:nvSpPr>
+            <p:spPr>
+              <a:xfrm rot="5400000">
+                <a:off x="4824678" y="1978904"/>
+                <a:ext cx="182922" cy="437199"/>
+              </a:xfrm>
+              <a:prstGeom prst="leftBrace">
+                <a:avLst/>
+              </a:prstGeom>
+              <a:ln>
+                <a:solidFill>
+                  <a:schemeClr val="tx1"/>
+                </a:solidFill>
+              </a:ln>
+            </p:spPr>
+            <p:style>
+              <a:lnRef idx="1">
+                <a:schemeClr val="accent1"/>
+              </a:lnRef>
+              <a:fillRef idx="0">
+                <a:schemeClr val="accent1"/>
+              </a:fillRef>
+              <a:effectRef idx="0">
+                <a:schemeClr val="accent1"/>
+              </a:effectRef>
+              <a:fontRef idx="minor">
+                <a:schemeClr val="tx1"/>
+              </a:fontRef>
+            </p:style>
+            <p:txBody>
+              <a:bodyPr rtlCol="0" anchor="ctr"/>
+              <a:lstStyle/>
+              <a:p>
+                <a:pPr algn="ctr"/>
+                <a:endParaRPr lang="en-US"/>
+              </a:p>
+            </p:txBody>
+          </p:sp>
+          <p:sp>
+            <p:nvSpPr>
+              <p:cNvPr id="48" name="TextBox 47"/>
+              <p:cNvSpPr txBox="1"/>
+              <p:nvPr/>
+            </p:nvSpPr>
+            <p:spPr>
+              <a:xfrm>
+                <a:off x="4555454" y="1775284"/>
+                <a:ext cx="716936" cy="276999"/>
+              </a:xfrm>
+              <a:prstGeom prst="rect">
+                <a:avLst/>
+              </a:prstGeom>
+              <a:noFill/>
+            </p:spPr>
+            <p:txBody>
+              <a:bodyPr wrap="square" rtlCol="0">
+                <a:spAutoFit/>
+              </a:bodyPr>
+              <a:lstStyle/>
+              <a:p>
+                <a:pPr algn="ctr"/>
+                <a:r>
+                  <a:rPr lang="en-US" altLang="zh-CN" sz="1200" dirty="0" err="1" smtClean="0"/>
+                  <a:t>InGaAs</a:t>
+                </a:r>
+                <a:endParaRPr lang="en-US" sz="1200" dirty="0"/>
+              </a:p>
+            </p:txBody>
+          </p:sp>
+        </p:grpSp>
+        <p:sp>
+          <p:nvSpPr>
+            <p:cNvPr id="50" name="TextBox 49"/>
+            <p:cNvSpPr txBox="1"/>
+            <p:nvPr/>
+          </p:nvSpPr>
+          <p:spPr>
+            <a:xfrm>
+              <a:off x="3439012" y="888653"/>
+              <a:ext cx="456225" cy="276999"/>
+            </a:xfrm>
+            <a:prstGeom prst="rect">
+              <a:avLst/>
+            </a:prstGeom>
+            <a:noFill/>
+          </p:spPr>
+          <p:txBody>
+            <a:bodyPr wrap="square" rtlCol="0">
+              <a:spAutoFit/>
+            </a:bodyPr>
+            <a:lstStyle/>
+            <a:p>
+              <a:r>
+                <a:rPr lang="en-US" sz="1200" dirty="0" smtClean="0"/>
+                <a:t>(a)</a:t>
+              </a:r>
+              <a:endParaRPr lang="en-US" sz="1200" dirty="0"/>
+            </a:p>
+          </p:txBody>
+        </p:sp>
+        <p:sp>
+          <p:nvSpPr>
+            <p:cNvPr id="51" name="TextBox 50"/>
+            <p:cNvSpPr txBox="1"/>
+            <p:nvPr/>
+          </p:nvSpPr>
+          <p:spPr>
+            <a:xfrm>
+              <a:off x="3439012" y="3335169"/>
+              <a:ext cx="456225" cy="276999"/>
+            </a:xfrm>
+            <a:prstGeom prst="rect">
+              <a:avLst/>
+            </a:prstGeom>
+            <a:noFill/>
+          </p:spPr>
+          <p:txBody>
+            <a:bodyPr wrap="square" rtlCol="0">
+              <a:spAutoFit/>
+            </a:bodyPr>
+            <a:lstStyle/>
+            <a:p>
+              <a:r>
+                <a:rPr lang="en-US" sz="1200" dirty="0" smtClean="0"/>
+                <a:t>(b)</a:t>
+              </a:r>
+              <a:endParaRPr lang="en-US" sz="1200" dirty="0"/>
+            </a:p>
+          </p:txBody>
+        </p:sp>
+      </p:grpSp>
+    </p:spTree>
+    <p:extLst>
+      <p:ext uri="{BB962C8B-B14F-4D97-AF65-F5344CB8AC3E}">
+        <p14:creationId xmlns:p14="http://schemas.microsoft.com/office/powerpoint/2010/main" val="3182379709"/>
+      </p:ext>
+    </p:extLst>
+  </p:cSld>
+  <p:clrMapOvr>
+    <a:masterClrMapping/>
+  </p:clrMapOvr>
+</p:sld>
+</file>
+
+<file path=ppt/slides/slide11.xml><?xml version="1.0" encoding="utf-8"?>
+<p:sld xmlns:a="http://schemas.openxmlformats.org/drawingml/2006/main" xmlns:r="http://schemas.openxmlformats.org/officeDocument/2006/relationships" xmlns:p="http://schemas.openxmlformats.org/presentationml/2006/main">
+  <p:cSld>
+    <p:spTree>
+      <p:nvGrpSpPr>
+        <p:cNvPr id="1" name=""/>
+        <p:cNvGrpSpPr/>
+        <p:nvPr/>
+      </p:nvGrpSpPr>
+      <p:grpSpPr>
+        <a:xfrm>
+          <a:off x="0" y="0"/>
+          <a:ext cx="0" cy="0"/>
+          <a:chOff x="0" y="0"/>
+          <a:chExt cx="0" cy="0"/>
+        </a:xfrm>
+      </p:grpSpPr>
+      <p:grpSp>
+        <p:nvGrpSpPr>
+          <p:cNvPr id="77" name="Group 76"/>
+          <p:cNvGrpSpPr/>
+          <p:nvPr/>
+        </p:nvGrpSpPr>
+        <p:grpSpPr>
+          <a:xfrm>
+            <a:off x="1983014" y="671660"/>
+            <a:ext cx="7639876" cy="4709010"/>
+            <a:chOff x="1983014" y="671660"/>
+            <a:chExt cx="7639876" cy="4709010"/>
+          </a:xfrm>
+        </p:grpSpPr>
+        <p:grpSp>
+          <p:nvGrpSpPr>
+            <p:cNvPr id="73" name="Group 72"/>
+            <p:cNvGrpSpPr/>
+            <p:nvPr/>
+          </p:nvGrpSpPr>
+          <p:grpSpPr>
+            <a:xfrm>
+              <a:off x="1983014" y="751114"/>
+              <a:ext cx="3856355" cy="4629556"/>
+              <a:chOff x="2853872" y="963068"/>
+              <a:chExt cx="3856355" cy="4629556"/>
+            </a:xfrm>
+          </p:grpSpPr>
+          <p:grpSp>
+            <p:nvGrpSpPr>
+              <p:cNvPr id="69" name="Group 68"/>
+              <p:cNvGrpSpPr/>
+              <p:nvPr/>
+            </p:nvGrpSpPr>
+            <p:grpSpPr>
+              <a:xfrm>
+                <a:off x="2853872" y="963068"/>
+                <a:ext cx="3856355" cy="4629556"/>
+                <a:chOff x="2755900" y="647382"/>
+                <a:chExt cx="3856355" cy="4629556"/>
+              </a:xfrm>
+            </p:grpSpPr>
+            <p:grpSp>
+              <p:nvGrpSpPr>
+                <p:cNvPr id="65" name="Group 64"/>
+                <p:cNvGrpSpPr/>
+                <p:nvPr/>
+              </p:nvGrpSpPr>
+              <p:grpSpPr>
+                <a:xfrm>
+                  <a:off x="2755900" y="647382"/>
+                  <a:ext cx="3856355" cy="4629556"/>
+                  <a:chOff x="3146425" y="933132"/>
+                  <a:chExt cx="3856355" cy="4629556"/>
+                </a:xfrm>
+              </p:grpSpPr>
+              <p:sp>
+                <p:nvSpPr>
+                  <p:cNvPr id="22" name="Rectangle 21"/>
+                  <p:cNvSpPr/>
+                  <p:nvPr/>
+                </p:nvSpPr>
+                <p:spPr>
+                  <a:xfrm>
+                    <a:off x="3146425" y="3009901"/>
+                    <a:ext cx="3856355" cy="156211"/>
+                  </a:xfrm>
+                  <a:prstGeom prst="rect">
+                    <a:avLst/>
+                  </a:prstGeom>
+                  <a:solidFill>
+                    <a:schemeClr val="accent4">
+                      <a:lumMod val="50000"/>
+                    </a:schemeClr>
+                  </a:solidFill>
+                  <a:ln>
+                    <a:noFill/>
+                  </a:ln>
+                </p:spPr>
+                <p:style>
+                  <a:lnRef idx="2">
+                    <a:schemeClr val="accent1">
+                      <a:shade val="50000"/>
+                    </a:schemeClr>
+                  </a:lnRef>
+                  <a:fillRef idx="1">
+                    <a:schemeClr val="accent1"/>
+                  </a:fillRef>
+                  <a:effectRef idx="0">
+                    <a:schemeClr val="accent1"/>
+                  </a:effectRef>
+                  <a:fontRef idx="minor">
+                    <a:schemeClr val="lt1"/>
+                  </a:fontRef>
+                </p:style>
+                <p:txBody>
+                  <a:bodyPr rtlCol="0" anchor="ctr"/>
+                  <a:lstStyle/>
+                  <a:p>
+                    <a:pPr algn="ctr"/>
+                    <a:r>
+                      <a:rPr lang="en-US" sz="1100" dirty="0"/>
+                      <a:t>n</a:t>
+                    </a:r>
+                    <a:r>
+                      <a:rPr lang="en-US" sz="1100" dirty="0" smtClean="0"/>
+                      <a:t>-</a:t>
+                    </a:r>
+                    <a:r>
+                      <a:rPr lang="en-US" sz="1100" dirty="0" err="1" smtClean="0"/>
+                      <a:t>InP</a:t>
+                    </a:r>
+                    <a:endParaRPr lang="en-US" sz="1100" dirty="0"/>
+                  </a:p>
+                </p:txBody>
+              </p:sp>
+              <p:cxnSp>
+                <p:nvCxnSpPr>
+                  <p:cNvPr id="6" name="Straight Arrow Connector 5"/>
+                  <p:cNvCxnSpPr/>
+                  <p:nvPr/>
+                </p:nvCxnSpPr>
+                <p:spPr>
+                  <a:xfrm>
+                    <a:off x="5425896" y="1263308"/>
+                    <a:ext cx="366890" cy="0"/>
+                  </a:xfrm>
+                  <a:prstGeom prst="straightConnector1">
+                    <a:avLst/>
+                  </a:prstGeom>
+                  <a:ln>
+                    <a:solidFill>
+                      <a:schemeClr val="tx1"/>
+                    </a:solidFill>
+                    <a:tailEnd type="triangle"/>
+                  </a:ln>
+                </p:spPr>
+                <p:style>
+                  <a:lnRef idx="1">
+                    <a:schemeClr val="accent1"/>
+                  </a:lnRef>
+                  <a:fillRef idx="0">
+                    <a:schemeClr val="accent1"/>
+                  </a:fillRef>
+                  <a:effectRef idx="0">
+                    <a:schemeClr val="accent1"/>
+                  </a:effectRef>
+                  <a:fontRef idx="minor">
+                    <a:schemeClr val="tx1"/>
+                  </a:fontRef>
+                </p:style>
+              </p:cxnSp>
+              <p:sp>
+                <p:nvSpPr>
+                  <p:cNvPr id="7" name="TextBox 6"/>
+                  <p:cNvSpPr txBox="1"/>
+                  <p:nvPr/>
+                </p:nvSpPr>
+                <p:spPr>
+                  <a:xfrm>
+                    <a:off x="5792786" y="1132503"/>
+                    <a:ext cx="673100" cy="276999"/>
+                  </a:xfrm>
+                  <a:prstGeom prst="rect">
+                    <a:avLst/>
+                  </a:prstGeom>
+                  <a:noFill/>
+                </p:spPr>
+                <p:txBody>
+                  <a:bodyPr wrap="square" rtlCol="0">
+                    <a:spAutoFit/>
+                  </a:bodyPr>
+                  <a:lstStyle/>
+                  <a:p>
+                    <a:r>
+                      <a:rPr lang="en-US" altLang="zh-CN" sz="1200" dirty="0" err="1" smtClean="0"/>
+                      <a:t>InGaAs</a:t>
+                    </a:r>
+                    <a:endParaRPr lang="en-US" sz="1200" dirty="0"/>
+                  </a:p>
+                </p:txBody>
+              </p:sp>
+              <p:sp>
+                <p:nvSpPr>
+                  <p:cNvPr id="8" name="TextBox 7"/>
+                  <p:cNvSpPr txBox="1"/>
+                  <p:nvPr/>
+                </p:nvSpPr>
+                <p:spPr>
+                  <a:xfrm>
+                    <a:off x="5792786" y="1589703"/>
+                    <a:ext cx="673100" cy="276999"/>
+                  </a:xfrm>
+                  <a:prstGeom prst="rect">
+                    <a:avLst/>
+                  </a:prstGeom>
+                  <a:noFill/>
+                </p:spPr>
+                <p:txBody>
+                  <a:bodyPr wrap="square" rtlCol="0">
+                    <a:spAutoFit/>
+                  </a:bodyPr>
+                  <a:lstStyle/>
+                  <a:p>
+                    <a:r>
+                      <a:rPr lang="en-US" altLang="zh-CN" sz="1200" dirty="0" smtClean="0"/>
+                      <a:t>p-</a:t>
+                    </a:r>
+                    <a:r>
+                      <a:rPr lang="en-US" altLang="zh-CN" sz="1200" dirty="0" err="1" smtClean="0"/>
+                      <a:t>InP</a:t>
+                    </a:r>
+                    <a:endParaRPr lang="en-US" sz="1200" dirty="0"/>
+                  </a:p>
+                </p:txBody>
+              </p:sp>
+              <p:cxnSp>
+                <p:nvCxnSpPr>
+                  <p:cNvPr id="9" name="Straight Arrow Connector 8"/>
+                  <p:cNvCxnSpPr/>
+                  <p:nvPr/>
+                </p:nvCxnSpPr>
+                <p:spPr>
+                  <a:xfrm>
+                    <a:off x="5425896" y="1720508"/>
+                    <a:ext cx="366890" cy="0"/>
+                  </a:xfrm>
+                  <a:prstGeom prst="straightConnector1">
+                    <a:avLst/>
+                  </a:prstGeom>
+                  <a:ln>
+                    <a:solidFill>
+                      <a:schemeClr val="tx1"/>
+                    </a:solidFill>
+                    <a:tailEnd type="triangle"/>
+                  </a:ln>
+                </p:spPr>
+                <p:style>
+                  <a:lnRef idx="1">
+                    <a:schemeClr val="accent1"/>
+                  </a:lnRef>
+                  <a:fillRef idx="0">
+                    <a:schemeClr val="accent1"/>
+                  </a:fillRef>
+                  <a:effectRef idx="0">
+                    <a:schemeClr val="accent1"/>
+                  </a:effectRef>
+                  <a:fontRef idx="minor">
+                    <a:schemeClr val="tx1"/>
+                  </a:fontRef>
+                </p:style>
+              </p:cxnSp>
+              <p:cxnSp>
+                <p:nvCxnSpPr>
+                  <p:cNvPr id="10" name="Straight Arrow Connector 9"/>
+                  <p:cNvCxnSpPr/>
+                  <p:nvPr/>
+                </p:nvCxnSpPr>
+                <p:spPr>
+                  <a:xfrm>
+                    <a:off x="5425896" y="2634908"/>
+                    <a:ext cx="366890" cy="0"/>
+                  </a:xfrm>
+                  <a:prstGeom prst="straightConnector1">
+                    <a:avLst/>
+                  </a:prstGeom>
+                  <a:ln>
+                    <a:solidFill>
+                      <a:schemeClr val="tx1"/>
+                    </a:solidFill>
+                    <a:tailEnd type="triangle"/>
+                  </a:ln>
+                </p:spPr>
+                <p:style>
+                  <a:lnRef idx="1">
+                    <a:schemeClr val="accent1"/>
+                  </a:lnRef>
+                  <a:fillRef idx="0">
+                    <a:schemeClr val="accent1"/>
+                  </a:fillRef>
+                  <a:effectRef idx="0">
+                    <a:schemeClr val="accent1"/>
+                  </a:effectRef>
+                  <a:fontRef idx="minor">
+                    <a:schemeClr val="tx1"/>
+                  </a:fontRef>
+                </p:style>
+              </p:cxnSp>
+              <p:cxnSp>
+                <p:nvCxnSpPr>
+                  <p:cNvPr id="11" name="Straight Arrow Connector 10"/>
+                  <p:cNvCxnSpPr/>
+                  <p:nvPr/>
+                </p:nvCxnSpPr>
+                <p:spPr>
+                  <a:xfrm>
+                    <a:off x="5425896" y="2961842"/>
+                    <a:ext cx="366890" cy="0"/>
+                  </a:xfrm>
+                  <a:prstGeom prst="straightConnector1">
+                    <a:avLst/>
+                  </a:prstGeom>
+                  <a:ln>
+                    <a:solidFill>
+                      <a:schemeClr val="tx1"/>
+                    </a:solidFill>
+                    <a:tailEnd type="triangle"/>
+                  </a:ln>
+                </p:spPr>
+                <p:style>
+                  <a:lnRef idx="1">
+                    <a:schemeClr val="accent1"/>
+                  </a:lnRef>
+                  <a:fillRef idx="0">
+                    <a:schemeClr val="accent1"/>
+                  </a:fillRef>
+                  <a:effectRef idx="0">
+                    <a:schemeClr val="accent1"/>
+                  </a:effectRef>
+                  <a:fontRef idx="minor">
+                    <a:schemeClr val="tx1"/>
+                  </a:fontRef>
+                </p:style>
+              </p:cxnSp>
+              <p:sp>
+                <p:nvSpPr>
+                  <p:cNvPr id="12" name="TextBox 11"/>
+                  <p:cNvSpPr txBox="1"/>
+                  <p:nvPr/>
+                </p:nvSpPr>
+                <p:spPr>
+                  <a:xfrm>
+                    <a:off x="5792786" y="2468319"/>
+                    <a:ext cx="673100" cy="276999"/>
+                  </a:xfrm>
+                  <a:prstGeom prst="rect">
+                    <a:avLst/>
+                  </a:prstGeom>
+                  <a:noFill/>
+                </p:spPr>
+                <p:txBody>
+                  <a:bodyPr wrap="square" rtlCol="0">
+                    <a:spAutoFit/>
+                  </a:bodyPr>
+                  <a:lstStyle/>
+                  <a:p>
+                    <a:r>
+                      <a:rPr lang="en-US" altLang="zh-CN" sz="1200" dirty="0" smtClean="0"/>
+                      <a:t>SCH</a:t>
+                    </a:r>
+                    <a:endParaRPr lang="en-US" sz="1200" dirty="0"/>
+                  </a:p>
+                </p:txBody>
+              </p:sp>
+              <p:sp>
+                <p:nvSpPr>
+                  <p:cNvPr id="13" name="TextBox 12"/>
+                  <p:cNvSpPr txBox="1"/>
+                  <p:nvPr/>
+                </p:nvSpPr>
+                <p:spPr>
+                  <a:xfrm>
+                    <a:off x="5792786" y="2823343"/>
+                    <a:ext cx="673100" cy="276999"/>
+                  </a:xfrm>
+                  <a:prstGeom prst="rect">
+                    <a:avLst/>
+                  </a:prstGeom>
+                  <a:noFill/>
+                </p:spPr>
+                <p:txBody>
+                  <a:bodyPr wrap="square" rtlCol="0">
+                    <a:spAutoFit/>
+                  </a:bodyPr>
+                  <a:lstStyle/>
+                  <a:p>
+                    <a:r>
+                      <a:rPr lang="en-US" altLang="zh-CN" sz="1200" dirty="0" smtClean="0"/>
+                      <a:t>SCH</a:t>
+                    </a:r>
+                    <a:endParaRPr lang="en-US" sz="1200" dirty="0"/>
+                  </a:p>
+                </p:txBody>
+              </p:sp>
+              <p:cxnSp>
+                <p:nvCxnSpPr>
+                  <p:cNvPr id="14" name="Straight Arrow Connector 13"/>
+                  <p:cNvCxnSpPr/>
+                  <p:nvPr/>
+                </p:nvCxnSpPr>
+                <p:spPr>
+                  <a:xfrm>
+                    <a:off x="5425896" y="2780254"/>
+                    <a:ext cx="366890" cy="0"/>
+                  </a:xfrm>
+                  <a:prstGeom prst="straightConnector1">
+                    <a:avLst/>
+                  </a:prstGeom>
+                  <a:ln>
+                    <a:solidFill>
+                      <a:schemeClr val="tx1"/>
+                    </a:solidFill>
+                    <a:tailEnd type="triangle"/>
+                  </a:ln>
+                </p:spPr>
+                <p:style>
+                  <a:lnRef idx="1">
+                    <a:schemeClr val="accent1"/>
+                  </a:lnRef>
+                  <a:fillRef idx="0">
+                    <a:schemeClr val="accent1"/>
+                  </a:fillRef>
+                  <a:effectRef idx="0">
+                    <a:schemeClr val="accent1"/>
+                  </a:effectRef>
+                  <a:fontRef idx="minor">
+                    <a:schemeClr val="tx1"/>
+                  </a:fontRef>
+                </p:style>
+              </p:cxnSp>
+              <p:sp>
+                <p:nvSpPr>
+                  <p:cNvPr id="15" name="TextBox 14"/>
+                  <p:cNvSpPr txBox="1"/>
+                  <p:nvPr/>
+                </p:nvSpPr>
+                <p:spPr>
+                  <a:xfrm>
+                    <a:off x="5792786" y="2662998"/>
+                    <a:ext cx="673100" cy="276999"/>
+                  </a:xfrm>
+                  <a:prstGeom prst="rect">
+                    <a:avLst/>
+                  </a:prstGeom>
+                  <a:noFill/>
+                </p:spPr>
+                <p:txBody>
+                  <a:bodyPr wrap="square" rtlCol="0">
+                    <a:spAutoFit/>
+                  </a:bodyPr>
+                  <a:lstStyle/>
+                  <a:p>
+                    <a:r>
+                      <a:rPr lang="en-US" altLang="zh-CN" sz="1200" dirty="0" smtClean="0"/>
+                      <a:t>MQW</a:t>
+                    </a:r>
+                    <a:endParaRPr lang="en-US" sz="1200" dirty="0"/>
+                  </a:p>
+                </p:txBody>
+              </p:sp>
+              <p:grpSp>
+                <p:nvGrpSpPr>
+                  <p:cNvPr id="26" name="Group 25"/>
+                  <p:cNvGrpSpPr/>
+                  <p:nvPr/>
+                </p:nvGrpSpPr>
+                <p:grpSpPr>
+                  <a:xfrm>
+                    <a:off x="4752975" y="1223010"/>
+                    <a:ext cx="643255" cy="1786891"/>
+                    <a:chOff x="3830955" y="1156335"/>
+                    <a:chExt cx="1828800" cy="1786891"/>
+                  </a:xfrm>
+                </p:grpSpPr>
+                <p:sp>
+                  <p:nvSpPr>
+                    <p:cNvPr id="19" name="Rectangle 18"/>
+                    <p:cNvSpPr/>
+                    <p:nvPr/>
+                  </p:nvSpPr>
+                  <p:spPr>
+                    <a:xfrm>
+                      <a:off x="3830955" y="1156335"/>
+                      <a:ext cx="1828800" cy="161290"/>
+                    </a:xfrm>
+                    <a:prstGeom prst="rect">
+                      <a:avLst/>
+                    </a:prstGeom>
+                    <a:solidFill>
+                      <a:schemeClr val="accent4">
+                        <a:lumMod val="75000"/>
+                      </a:schemeClr>
+                    </a:solidFill>
+                    <a:ln>
+                      <a:noFill/>
+                    </a:ln>
+                  </p:spPr>
+                  <p:style>
+                    <a:lnRef idx="2">
+                      <a:schemeClr val="accent1">
+                        <a:shade val="50000"/>
+                      </a:schemeClr>
+                    </a:lnRef>
+                    <a:fillRef idx="1">
+                      <a:schemeClr val="accent1"/>
+                    </a:fillRef>
+                    <a:effectRef idx="0">
+                      <a:schemeClr val="accent1"/>
+                    </a:effectRef>
+                    <a:fontRef idx="minor">
+                      <a:schemeClr val="lt1"/>
+                    </a:fontRef>
+                  </p:style>
+                  <p:txBody>
+                    <a:bodyPr rtlCol="0" anchor="ctr"/>
+                    <a:lstStyle/>
+                    <a:p>
+                      <a:pPr algn="ctr"/>
+                      <a:endParaRPr lang="en-US"/>
+                    </a:p>
+                  </p:txBody>
+                </p:sp>
+                <p:sp>
+                  <p:nvSpPr>
+                    <p:cNvPr id="20" name="Rectangle 19"/>
+                    <p:cNvSpPr/>
+                    <p:nvPr/>
+                  </p:nvSpPr>
+                  <p:spPr>
+                    <a:xfrm>
+                      <a:off x="3830955" y="2489835"/>
+                      <a:ext cx="1828800" cy="160020"/>
+                    </a:xfrm>
+                    <a:prstGeom prst="rect">
+                      <a:avLst/>
+                    </a:prstGeom>
+                    <a:solidFill>
+                      <a:srgbClr val="FF0000"/>
+                    </a:solidFill>
+                    <a:ln>
+                      <a:noFill/>
+                    </a:ln>
+                  </p:spPr>
+                  <p:style>
+                    <a:lnRef idx="2">
+                      <a:schemeClr val="accent1">
+                        <a:shade val="50000"/>
+                      </a:schemeClr>
+                    </a:lnRef>
+                    <a:fillRef idx="1">
+                      <a:schemeClr val="accent1"/>
+                    </a:fillRef>
+                    <a:effectRef idx="0">
+                      <a:schemeClr val="accent1"/>
+                    </a:effectRef>
+                    <a:fontRef idx="minor">
+                      <a:schemeClr val="lt1"/>
+                    </a:fontRef>
+                  </p:style>
+                  <p:txBody>
+                    <a:bodyPr rtlCol="0" anchor="ctr"/>
+                    <a:lstStyle/>
+                    <a:p>
+                      <a:pPr algn="ctr"/>
+                      <a:endParaRPr lang="en-US"/>
+                    </a:p>
+                  </p:txBody>
+                </p:sp>
+                <p:sp>
+                  <p:nvSpPr>
+                    <p:cNvPr id="21" name="Rectangle 20"/>
+                    <p:cNvSpPr/>
+                    <p:nvPr/>
+                  </p:nvSpPr>
+                  <p:spPr>
+                    <a:xfrm>
+                      <a:off x="3830955" y="2806066"/>
+                      <a:ext cx="1828800" cy="137160"/>
+                    </a:xfrm>
+                    <a:prstGeom prst="rect">
+                      <a:avLst/>
+                    </a:prstGeom>
+                    <a:solidFill>
+                      <a:srgbClr val="FF0000"/>
+                    </a:solidFill>
+                    <a:ln>
+                      <a:noFill/>
+                    </a:ln>
+                  </p:spPr>
+                  <p:style>
+                    <a:lnRef idx="2">
+                      <a:schemeClr val="accent1">
+                        <a:shade val="50000"/>
+                      </a:schemeClr>
+                    </a:lnRef>
+                    <a:fillRef idx="1">
+                      <a:schemeClr val="accent1"/>
+                    </a:fillRef>
+                    <a:effectRef idx="0">
+                      <a:schemeClr val="accent1"/>
+                    </a:effectRef>
+                    <a:fontRef idx="minor">
+                      <a:schemeClr val="lt1"/>
+                    </a:fontRef>
+                  </p:style>
+                  <p:txBody>
+                    <a:bodyPr rtlCol="0" anchor="ctr"/>
+                    <a:lstStyle/>
+                    <a:p>
+                      <a:pPr algn="ctr"/>
+                      <a:endParaRPr lang="en-US"/>
+                    </a:p>
+                  </p:txBody>
+                </p:sp>
+                <p:sp>
+                  <p:nvSpPr>
+                    <p:cNvPr id="24" name="Rectangle 23"/>
+                    <p:cNvSpPr/>
+                    <p:nvPr/>
+                  </p:nvSpPr>
+                  <p:spPr>
+                    <a:xfrm>
+                      <a:off x="3830955" y="2649855"/>
+                      <a:ext cx="1828800" cy="156211"/>
+                    </a:xfrm>
+                    <a:prstGeom prst="rect">
+                      <a:avLst/>
+                    </a:prstGeom>
+                    <a:solidFill>
+                      <a:srgbClr val="FF7979"/>
+                    </a:solidFill>
+                    <a:ln>
+                      <a:noFill/>
+                    </a:ln>
+                  </p:spPr>
+                  <p:style>
+                    <a:lnRef idx="2">
+                      <a:schemeClr val="accent1">
+                        <a:shade val="50000"/>
+                      </a:schemeClr>
+                    </a:lnRef>
+                    <a:fillRef idx="1">
+                      <a:schemeClr val="accent1"/>
+                    </a:fillRef>
+                    <a:effectRef idx="0">
+                      <a:schemeClr val="accent1"/>
+                    </a:effectRef>
+                    <a:fontRef idx="minor">
+                      <a:schemeClr val="lt1"/>
+                    </a:fontRef>
+                  </p:style>
+                  <p:txBody>
+                    <a:bodyPr rtlCol="0" anchor="ctr"/>
+                    <a:lstStyle/>
+                    <a:p>
+                      <a:pPr algn="ctr"/>
+                      <a:endParaRPr lang="en-US"/>
+                    </a:p>
+                  </p:txBody>
+                </p:sp>
+                <p:sp>
+                  <p:nvSpPr>
+                    <p:cNvPr id="25" name="Rectangle 24"/>
+                    <p:cNvSpPr/>
+                    <p:nvPr/>
+                  </p:nvSpPr>
+                  <p:spPr>
+                    <a:xfrm>
+                      <a:off x="3830955" y="1263016"/>
+                      <a:ext cx="1828800" cy="1226820"/>
+                    </a:xfrm>
+                    <a:prstGeom prst="rect">
+                      <a:avLst/>
+                    </a:prstGeom>
+                    <a:solidFill>
+                      <a:srgbClr val="FFB200"/>
+                    </a:solidFill>
+                    <a:ln>
+                      <a:noFill/>
+                    </a:ln>
+                  </p:spPr>
+                  <p:style>
+                    <a:lnRef idx="2">
+                      <a:schemeClr val="accent1">
+                        <a:shade val="50000"/>
+                      </a:schemeClr>
+                    </a:lnRef>
+                    <a:fillRef idx="1">
+                      <a:schemeClr val="accent1"/>
+                    </a:fillRef>
+                    <a:effectRef idx="0">
+                      <a:schemeClr val="accent1"/>
+                    </a:effectRef>
+                    <a:fontRef idx="minor">
+                      <a:schemeClr val="lt1"/>
+                    </a:fontRef>
+                  </p:style>
+                  <p:txBody>
+                    <a:bodyPr rtlCol="0" anchor="ctr"/>
+                    <a:lstStyle/>
+                    <a:p>
+                      <a:pPr algn="ctr"/>
+                      <a:endParaRPr lang="en-US"/>
+                    </a:p>
+                  </p:txBody>
+                </p:sp>
+              </p:grpSp>
+              <p:sp>
+                <p:nvSpPr>
+                  <p:cNvPr id="27" name="Rectangle 26"/>
+                  <p:cNvSpPr/>
+                  <p:nvPr/>
+                </p:nvSpPr>
+                <p:spPr>
+                  <a:xfrm>
+                    <a:off x="4752975" y="962025"/>
+                    <a:ext cx="643255" cy="260985"/>
+                  </a:xfrm>
+                  <a:prstGeom prst="rect">
+                    <a:avLst/>
+                  </a:prstGeom>
+                  <a:solidFill>
+                    <a:srgbClr val="FFFF00"/>
+                  </a:solidFill>
+                  <a:ln>
+                    <a:noFill/>
+                  </a:ln>
+                </p:spPr>
+                <p:style>
+                  <a:lnRef idx="2">
+                    <a:schemeClr val="accent1">
+                      <a:shade val="50000"/>
+                    </a:schemeClr>
+                  </a:lnRef>
+                  <a:fillRef idx="1">
+                    <a:schemeClr val="accent1"/>
+                  </a:fillRef>
+                  <a:effectRef idx="0">
+                    <a:schemeClr val="accent1"/>
+                  </a:effectRef>
+                  <a:fontRef idx="minor">
+                    <a:schemeClr val="lt1"/>
+                  </a:fontRef>
+                </p:style>
+                <p:txBody>
+                  <a:bodyPr rtlCol="0" anchor="ctr"/>
+                  <a:lstStyle/>
+                  <a:p>
+                    <a:pPr algn="ctr"/>
+                    <a:endParaRPr lang="en-US"/>
+                  </a:p>
+                </p:txBody>
+              </p:sp>
+              <p:sp>
+                <p:nvSpPr>
+                  <p:cNvPr id="28" name="Rectangle 27"/>
+                  <p:cNvSpPr/>
+                  <p:nvPr/>
+                </p:nvSpPr>
+                <p:spPr>
+                  <a:xfrm>
+                    <a:off x="3146425" y="2823343"/>
+                    <a:ext cx="643255" cy="189108"/>
+                  </a:xfrm>
+                  <a:prstGeom prst="rect">
+                    <a:avLst/>
+                  </a:prstGeom>
+                  <a:solidFill>
+                    <a:srgbClr val="FFFF00"/>
+                  </a:solidFill>
+                  <a:ln>
+                    <a:noFill/>
+                  </a:ln>
+                </p:spPr>
+                <p:style>
+                  <a:lnRef idx="2">
+                    <a:schemeClr val="accent1">
+                      <a:shade val="50000"/>
+                    </a:schemeClr>
+                  </a:lnRef>
+                  <a:fillRef idx="1">
+                    <a:schemeClr val="accent1"/>
+                  </a:fillRef>
+                  <a:effectRef idx="0">
+                    <a:schemeClr val="accent1"/>
+                  </a:effectRef>
+                  <a:fontRef idx="minor">
+                    <a:schemeClr val="lt1"/>
+                  </a:fontRef>
+                </p:style>
+                <p:txBody>
+                  <a:bodyPr rtlCol="0" anchor="ctr"/>
+                  <a:lstStyle/>
+                  <a:p>
+                    <a:pPr algn="ctr"/>
+                    <a:endParaRPr lang="en-US"/>
+                  </a:p>
+                </p:txBody>
+              </p:sp>
+              <p:sp>
+                <p:nvSpPr>
+                  <p:cNvPr id="29" name="Rectangle 28"/>
+                  <p:cNvSpPr/>
+                  <p:nvPr/>
+                </p:nvSpPr>
+                <p:spPr>
+                  <a:xfrm>
+                    <a:off x="6359525" y="2823343"/>
+                    <a:ext cx="643255" cy="189108"/>
+                  </a:xfrm>
+                  <a:prstGeom prst="rect">
+                    <a:avLst/>
+                  </a:prstGeom>
+                  <a:solidFill>
+                    <a:srgbClr val="FFFF00"/>
+                  </a:solidFill>
+                  <a:ln>
+                    <a:noFill/>
+                  </a:ln>
+                </p:spPr>
+                <p:style>
+                  <a:lnRef idx="2">
+                    <a:schemeClr val="accent1">
+                      <a:shade val="50000"/>
+                    </a:schemeClr>
+                  </a:lnRef>
+                  <a:fillRef idx="1">
+                    <a:schemeClr val="accent1"/>
+                  </a:fillRef>
+                  <a:effectRef idx="0">
+                    <a:schemeClr val="accent1"/>
+                  </a:effectRef>
+                  <a:fontRef idx="minor">
+                    <a:schemeClr val="lt1"/>
+                  </a:fontRef>
+                </p:style>
+                <p:txBody>
+                  <a:bodyPr rtlCol="0" anchor="ctr"/>
+                  <a:lstStyle/>
+                  <a:p>
+                    <a:pPr algn="ctr"/>
+                    <a:endParaRPr lang="en-US"/>
+                  </a:p>
+                </p:txBody>
+              </p:sp>
+              <p:sp>
+                <p:nvSpPr>
+                  <p:cNvPr id="32" name="Rectangle 31"/>
+                  <p:cNvSpPr/>
+                  <p:nvPr/>
+                </p:nvSpPr>
+                <p:spPr>
+                  <a:xfrm>
+                    <a:off x="3146425" y="4498342"/>
+                    <a:ext cx="3856355" cy="1064346"/>
+                  </a:xfrm>
+                  <a:custGeom>
+                    <a:avLst/>
+                    <a:gdLst>
+                      <a:gd name="connsiteX0" fmla="*/ 0 w 3856355"/>
+                      <a:gd name="connsiteY0" fmla="*/ 0 h 936623"/>
+                      <a:gd name="connsiteX1" fmla="*/ 3856355 w 3856355"/>
+                      <a:gd name="connsiteY1" fmla="*/ 0 h 936623"/>
+                      <a:gd name="connsiteX2" fmla="*/ 3856355 w 3856355"/>
+                      <a:gd name="connsiteY2" fmla="*/ 936623 h 936623"/>
+                      <a:gd name="connsiteX3" fmla="*/ 0 w 3856355"/>
+                      <a:gd name="connsiteY3" fmla="*/ 936623 h 936623"/>
+                      <a:gd name="connsiteX4" fmla="*/ 0 w 3856355"/>
+                      <a:gd name="connsiteY4" fmla="*/ 0 h 936623"/>
+                      <a:gd name="connsiteX0" fmla="*/ 0 w 3856355"/>
+                      <a:gd name="connsiteY0" fmla="*/ 0 h 936623"/>
+                      <a:gd name="connsiteX1" fmla="*/ 3856355 w 3856355"/>
+                      <a:gd name="connsiteY1" fmla="*/ 0 h 936623"/>
+                      <a:gd name="connsiteX2" fmla="*/ 3856355 w 3856355"/>
+                      <a:gd name="connsiteY2" fmla="*/ 936623 h 936623"/>
+                      <a:gd name="connsiteX3" fmla="*/ 830944 w 3856355"/>
+                      <a:gd name="connsiteY3" fmla="*/ 776059 h 936623"/>
+                      <a:gd name="connsiteX4" fmla="*/ 0 w 3856355"/>
+                      <a:gd name="connsiteY4" fmla="*/ 936623 h 936623"/>
+                      <a:gd name="connsiteX5" fmla="*/ 0 w 3856355"/>
+                      <a:gd name="connsiteY5" fmla="*/ 0 h 936623"/>
+                      <a:gd name="connsiteX0" fmla="*/ 0 w 3856355"/>
+                      <a:gd name="connsiteY0" fmla="*/ 0 h 1064346"/>
+                      <a:gd name="connsiteX1" fmla="*/ 3856355 w 3856355"/>
+                      <a:gd name="connsiteY1" fmla="*/ 0 h 1064346"/>
+                      <a:gd name="connsiteX2" fmla="*/ 3856355 w 3856355"/>
+                      <a:gd name="connsiteY2" fmla="*/ 936623 h 1064346"/>
+                      <a:gd name="connsiteX3" fmla="*/ 2942772 w 3856355"/>
+                      <a:gd name="connsiteY3" fmla="*/ 1048202 h 1064346"/>
+                      <a:gd name="connsiteX4" fmla="*/ 830944 w 3856355"/>
+                      <a:gd name="connsiteY4" fmla="*/ 776059 h 1064346"/>
+                      <a:gd name="connsiteX5" fmla="*/ 0 w 3856355"/>
+                      <a:gd name="connsiteY5" fmla="*/ 936623 h 1064346"/>
+                      <a:gd name="connsiteX6" fmla="*/ 0 w 3856355"/>
+                      <a:gd name="connsiteY6" fmla="*/ 0 h 1064346"/>
+                    </a:gdLst>
+                    <a:ahLst/>
+                    <a:cxnLst>
+                      <a:cxn ang="0">
+                        <a:pos x="connsiteX0" y="connsiteY0"/>
+                      </a:cxn>
+                      <a:cxn ang="0">
+                        <a:pos x="connsiteX1" y="connsiteY1"/>
+                      </a:cxn>
+                      <a:cxn ang="0">
+                        <a:pos x="connsiteX2" y="connsiteY2"/>
+                      </a:cxn>
+                      <a:cxn ang="0">
+                        <a:pos x="connsiteX3" y="connsiteY3"/>
+                      </a:cxn>
+                      <a:cxn ang="0">
+                        <a:pos x="connsiteX4" y="connsiteY4"/>
+                      </a:cxn>
+                      <a:cxn ang="0">
+                        <a:pos x="connsiteX5" y="connsiteY5"/>
+                      </a:cxn>
+                      <a:cxn ang="0">
+                        <a:pos x="connsiteX6" y="connsiteY6"/>
+                      </a:cxn>
+                    </a:cxnLst>
+                    <a:rect l="l" t="t" r="r" b="b"/>
+                    <a:pathLst>
+                      <a:path w="3856355" h="1064346">
+                        <a:moveTo>
+                          <a:pt x="0" y="0"/>
+                        </a:moveTo>
+                        <a:lnTo>
+                          <a:pt x="3856355" y="0"/>
+                        </a:lnTo>
+                        <a:lnTo>
+                          <a:pt x="3856355" y="936623"/>
+                        </a:lnTo>
+                        <a:cubicBezTo>
+                          <a:pt x="3707720" y="1085923"/>
+                          <a:pt x="3447007" y="1074963"/>
+                          <a:pt x="2942772" y="1048202"/>
+                        </a:cubicBezTo>
+                        <a:cubicBezTo>
+                          <a:pt x="2438537" y="1021441"/>
+                          <a:pt x="1325035" y="769256"/>
+                          <a:pt x="830944" y="776059"/>
+                        </a:cubicBezTo>
+                        <a:lnTo>
+                          <a:pt x="0" y="936623"/>
+                        </a:lnTo>
+                        <a:lnTo>
+                          <a:pt x="0" y="0"/>
+                        </a:lnTo>
+                        <a:close/>
+                      </a:path>
+                    </a:pathLst>
+                  </a:custGeom>
+                  <a:solidFill>
+                    <a:schemeClr val="bg2">
+                      <a:lumMod val="25000"/>
+                    </a:schemeClr>
+                  </a:solidFill>
+                  <a:ln>
+                    <a:noFill/>
+                  </a:ln>
+                </p:spPr>
+                <p:style>
+                  <a:lnRef idx="2">
+                    <a:schemeClr val="accent1">
+                      <a:shade val="50000"/>
+                    </a:schemeClr>
+                  </a:lnRef>
+                  <a:fillRef idx="1">
+                    <a:schemeClr val="accent1"/>
+                  </a:fillRef>
+                  <a:effectRef idx="0">
+                    <a:schemeClr val="accent1"/>
+                  </a:effectRef>
+                  <a:fontRef idx="minor">
+                    <a:schemeClr val="lt1"/>
+                  </a:fontRef>
+                </p:style>
+                <p:txBody>
+                  <a:bodyPr rtlCol="0" anchor="ctr"/>
+                  <a:lstStyle/>
+                  <a:p>
+                    <a:pPr algn="ctr"/>
+                    <a:r>
+                      <a:rPr lang="en-US" altLang="zh-CN" dirty="0" smtClean="0"/>
+                      <a:t>Substrate</a:t>
+                    </a:r>
+                    <a:endParaRPr lang="en-US" dirty="0"/>
+                  </a:p>
+                </p:txBody>
+              </p:sp>
+              <p:sp>
+                <p:nvSpPr>
+                  <p:cNvPr id="33" name="Rectangle 32"/>
+                  <p:cNvSpPr/>
+                  <p:nvPr/>
+                </p:nvSpPr>
+                <p:spPr>
+                  <a:xfrm>
+                    <a:off x="4894157" y="3242940"/>
+                    <a:ext cx="360890" cy="216544"/>
+                  </a:xfrm>
+                  <a:prstGeom prst="rect">
+                    <a:avLst/>
+                  </a:prstGeom>
+                  <a:solidFill>
+                    <a:schemeClr val="bg2">
+                      <a:lumMod val="25000"/>
+                    </a:schemeClr>
+                  </a:solidFill>
+                  <a:ln>
+                    <a:noFill/>
+                  </a:ln>
+                </p:spPr>
+                <p:style>
+                  <a:lnRef idx="2">
+                    <a:schemeClr val="accent1">
+                      <a:shade val="50000"/>
+                    </a:schemeClr>
+                  </a:lnRef>
+                  <a:fillRef idx="1">
+                    <a:schemeClr val="accent1"/>
+                  </a:fillRef>
+                  <a:effectRef idx="0">
+                    <a:schemeClr val="accent1"/>
+                  </a:effectRef>
+                  <a:fontRef idx="minor">
+                    <a:schemeClr val="lt1"/>
+                  </a:fontRef>
+                </p:style>
+                <p:txBody>
+                  <a:bodyPr rtlCol="0" anchor="ctr"/>
+                  <a:lstStyle/>
+                  <a:p>
+                    <a:pPr algn="ctr"/>
+                    <a:endParaRPr lang="en-US"/>
+                  </a:p>
+                </p:txBody>
+              </p:sp>
+              <p:sp>
+                <p:nvSpPr>
+                  <p:cNvPr id="31" name="Rectangle 30"/>
+                  <p:cNvSpPr/>
+                  <p:nvPr/>
+                </p:nvSpPr>
+                <p:spPr>
+                  <a:xfrm>
+                    <a:off x="3146425" y="3450028"/>
+                    <a:ext cx="3856355" cy="1053394"/>
+                  </a:xfrm>
+                  <a:prstGeom prst="rect">
+                    <a:avLst/>
+                  </a:prstGeom>
+                  <a:solidFill>
+                    <a:srgbClr val="00B0F0"/>
+                  </a:solidFill>
+                  <a:ln>
+                    <a:noFill/>
+                  </a:ln>
+                </p:spPr>
+                <p:style>
+                  <a:lnRef idx="2">
+                    <a:schemeClr val="accent1">
+                      <a:shade val="50000"/>
+                    </a:schemeClr>
+                  </a:lnRef>
+                  <a:fillRef idx="1">
+                    <a:schemeClr val="accent1"/>
+                  </a:fillRef>
+                  <a:effectRef idx="0">
+                    <a:schemeClr val="accent1"/>
+                  </a:effectRef>
+                  <a:fontRef idx="minor">
+                    <a:schemeClr val="lt1"/>
+                  </a:fontRef>
+                </p:style>
+                <p:txBody>
+                  <a:bodyPr rtlCol="0" anchor="ctr"/>
+                  <a:lstStyle/>
+                  <a:p>
+                    <a:pPr algn="ctr"/>
+                    <a:r>
+                      <a:rPr lang="en-US" altLang="zh-CN" dirty="0" smtClean="0"/>
+                      <a:t>SiO</a:t>
+                    </a:r>
+                    <a:r>
+                      <a:rPr lang="en-US" altLang="zh-CN" baseline="-25000" dirty="0" smtClean="0"/>
+                      <a:t>2</a:t>
+                    </a:r>
+                    <a:endParaRPr lang="en-US" baseline="-25000" dirty="0"/>
+                  </a:p>
+                </p:txBody>
+              </p:sp>
+              <p:cxnSp>
+                <p:nvCxnSpPr>
+                  <p:cNvPr id="36" name="Straight Arrow Connector 35"/>
+                  <p:cNvCxnSpPr/>
+                  <p:nvPr/>
+                </p:nvCxnSpPr>
+                <p:spPr>
+                  <a:xfrm>
+                    <a:off x="5425896" y="1063937"/>
+                    <a:ext cx="366890" cy="0"/>
+                  </a:xfrm>
+                  <a:prstGeom prst="straightConnector1">
+                    <a:avLst/>
+                  </a:prstGeom>
+                  <a:ln>
+                    <a:solidFill>
+                      <a:schemeClr val="tx1"/>
+                    </a:solidFill>
+                    <a:tailEnd type="triangle"/>
+                  </a:ln>
+                </p:spPr>
+                <p:style>
+                  <a:lnRef idx="1">
+                    <a:schemeClr val="accent1"/>
+                  </a:lnRef>
+                  <a:fillRef idx="0">
+                    <a:schemeClr val="accent1"/>
+                  </a:fillRef>
+                  <a:effectRef idx="0">
+                    <a:schemeClr val="accent1"/>
+                  </a:effectRef>
+                  <a:fontRef idx="minor">
+                    <a:schemeClr val="tx1"/>
+                  </a:fontRef>
+                </p:style>
+              </p:cxnSp>
+              <p:sp>
+                <p:nvSpPr>
+                  <p:cNvPr id="37" name="TextBox 36"/>
+                  <p:cNvSpPr txBox="1"/>
+                  <p:nvPr/>
+                </p:nvSpPr>
+                <p:spPr>
+                  <a:xfrm>
+                    <a:off x="5792786" y="933132"/>
+                    <a:ext cx="1106489" cy="276999"/>
+                  </a:xfrm>
+                  <a:prstGeom prst="rect">
+                    <a:avLst/>
+                  </a:prstGeom>
+                  <a:noFill/>
+                </p:spPr>
+                <p:txBody>
+                  <a:bodyPr wrap="square" rtlCol="0">
+                    <a:spAutoFit/>
+                  </a:bodyPr>
+                  <a:lstStyle/>
+                  <a:p>
+                    <a:r>
+                      <a:rPr lang="en-US" altLang="zh-CN" sz="1200" dirty="0" smtClean="0"/>
+                      <a:t>Source Metal</a:t>
+                    </a:r>
+                    <a:endParaRPr lang="en-US" sz="1200" dirty="0"/>
+                  </a:p>
+                </p:txBody>
+              </p:sp>
+              <p:cxnSp>
+                <p:nvCxnSpPr>
+                  <p:cNvPr id="38" name="Straight Arrow Connector 37"/>
+                  <p:cNvCxnSpPr/>
+                  <p:nvPr/>
+                </p:nvCxnSpPr>
+                <p:spPr>
+                  <a:xfrm>
+                    <a:off x="5242451" y="3315776"/>
+                    <a:ext cx="366890" cy="0"/>
+                  </a:xfrm>
+                  <a:prstGeom prst="straightConnector1">
+                    <a:avLst/>
+                  </a:prstGeom>
+                  <a:ln>
+                    <a:solidFill>
+                      <a:schemeClr val="tx1"/>
+                    </a:solidFill>
+                    <a:tailEnd type="triangle"/>
+                  </a:ln>
+                </p:spPr>
+                <p:style>
+                  <a:lnRef idx="1">
+                    <a:schemeClr val="accent1"/>
+                  </a:lnRef>
+                  <a:fillRef idx="0">
+                    <a:schemeClr val="accent1"/>
+                  </a:fillRef>
+                  <a:effectRef idx="0">
+                    <a:schemeClr val="accent1"/>
+                  </a:effectRef>
+                  <a:fontRef idx="minor">
+                    <a:schemeClr val="tx1"/>
+                  </a:fontRef>
+                </p:style>
+              </p:cxnSp>
+              <p:sp>
+                <p:nvSpPr>
+                  <p:cNvPr id="39" name="TextBox 38"/>
+                  <p:cNvSpPr txBox="1"/>
+                  <p:nvPr/>
+                </p:nvSpPr>
+                <p:spPr>
+                  <a:xfrm>
+                    <a:off x="5609341" y="3184971"/>
+                    <a:ext cx="673100" cy="276999"/>
+                  </a:xfrm>
+                  <a:prstGeom prst="rect">
+                    <a:avLst/>
+                  </a:prstGeom>
+                  <a:noFill/>
+                </p:spPr>
+                <p:txBody>
+                  <a:bodyPr wrap="square" rtlCol="0">
+                    <a:spAutoFit/>
+                  </a:bodyPr>
+                  <a:lstStyle/>
+                  <a:p>
+                    <a:r>
+                      <a:rPr lang="en-US" altLang="zh-CN" sz="1200" dirty="0" smtClean="0"/>
+                      <a:t>Si</a:t>
+                    </a:r>
+                    <a:endParaRPr lang="en-US" sz="1200" dirty="0"/>
+                  </a:p>
+                </p:txBody>
+              </p:sp>
+              <p:cxnSp>
+                <p:nvCxnSpPr>
+                  <p:cNvPr id="41" name="Straight Arrow Connector 40"/>
+                  <p:cNvCxnSpPr/>
+                  <p:nvPr/>
+                </p:nvCxnSpPr>
+                <p:spPr>
+                  <a:xfrm>
+                    <a:off x="4752975" y="2219325"/>
+                    <a:ext cx="643255" cy="0"/>
+                  </a:xfrm>
+                  <a:prstGeom prst="straightConnector1">
+                    <a:avLst/>
+                  </a:prstGeom>
+                  <a:ln>
+                    <a:headEnd type="triangle"/>
+                    <a:tailEnd type="triangle"/>
+                  </a:ln>
+                </p:spPr>
+                <p:style>
+                  <a:lnRef idx="1">
+                    <a:schemeClr val="accent1"/>
+                  </a:lnRef>
+                  <a:fillRef idx="0">
+                    <a:schemeClr val="accent1"/>
+                  </a:fillRef>
+                  <a:effectRef idx="0">
+                    <a:schemeClr val="accent1"/>
+                  </a:effectRef>
+                  <a:fontRef idx="minor">
+                    <a:schemeClr val="tx1"/>
+                  </a:fontRef>
+                </p:style>
+              </p:cxnSp>
+              <p:sp>
+                <p:nvSpPr>
+                  <p:cNvPr id="42" name="TextBox 41"/>
+                  <p:cNvSpPr txBox="1"/>
+                  <p:nvPr/>
+                </p:nvSpPr>
+                <p:spPr>
+                  <a:xfrm>
+                    <a:off x="4796283" y="1786454"/>
+                    <a:ext cx="663907" cy="400110"/>
+                  </a:xfrm>
+                  <a:prstGeom prst="rect">
+                    <a:avLst/>
+                  </a:prstGeom>
+                  <a:noFill/>
+                </p:spPr>
+                <p:txBody>
+                  <a:bodyPr wrap="square" rtlCol="0">
+                    <a:spAutoFit/>
+                  </a:bodyPr>
+                  <a:lstStyle/>
+                  <a:p>
+                    <a:r>
+                      <a:rPr lang="en-US" sz="2000" dirty="0" err="1" smtClean="0"/>
+                      <a:t>w</a:t>
+                    </a:r>
+                    <a:r>
+                      <a:rPr lang="en-US" sz="2000" baseline="-25000" dirty="0" err="1" smtClean="0"/>
+                      <a:t>wg</a:t>
+                    </a:r>
+                    <a:endParaRPr lang="en-US" sz="2000" baseline="-25000" dirty="0"/>
+                  </a:p>
+                </p:txBody>
+              </p:sp>
+              <p:sp>
+                <p:nvSpPr>
+                  <p:cNvPr id="46" name="TextBox 45"/>
+                  <p:cNvSpPr txBox="1"/>
+                  <p:nvPr/>
+                </p:nvSpPr>
+                <p:spPr>
+                  <a:xfrm>
+                    <a:off x="4747471" y="939919"/>
+                    <a:ext cx="494980" cy="297517"/>
+                  </a:xfrm>
+                  <a:prstGeom prst="rect">
+                    <a:avLst/>
+                  </a:prstGeom>
+                  <a:noFill/>
+                </p:spPr>
+                <p:txBody>
+                  <a:bodyPr wrap="square" rtlCol="0">
+                    <a:spAutoFit/>
+                  </a:bodyPr>
+                  <a:lstStyle/>
+                  <a:p>
+                    <a:r>
+                      <a:rPr lang="en-US" sz="2000" baseline="-25000" dirty="0" smtClean="0"/>
+                      <a:t>1</a:t>
+                    </a:r>
+                    <a:r>
+                      <a:rPr lang="el-GR" sz="2000" baseline="-25000" dirty="0" smtClean="0"/>
+                      <a:t>μ</a:t>
+                    </a:r>
+                    <a:r>
+                      <a:rPr lang="en-US" sz="2000" baseline="-25000" dirty="0" smtClean="0"/>
+                      <a:t>m</a:t>
+                    </a:r>
+                    <a:endParaRPr lang="en-US" sz="2000" baseline="-25000" dirty="0"/>
+                  </a:p>
+                </p:txBody>
+              </p:sp>
+              <p:sp>
+                <p:nvSpPr>
+                  <p:cNvPr id="47" name="TextBox 46"/>
+                  <p:cNvSpPr txBox="1"/>
+                  <p:nvPr/>
+                </p:nvSpPr>
+                <p:spPr>
+                  <a:xfrm>
+                    <a:off x="3395560" y="2711478"/>
+                    <a:ext cx="879844" cy="297517"/>
+                  </a:xfrm>
+                  <a:prstGeom prst="rect">
+                    <a:avLst/>
+                  </a:prstGeom>
+                  <a:noFill/>
+                </p:spPr>
+                <p:txBody>
+                  <a:bodyPr wrap="square" rtlCol="0">
+                    <a:spAutoFit/>
+                  </a:bodyPr>
+                  <a:lstStyle/>
+                  <a:p>
+                    <a:r>
+                      <a:rPr lang="en-US" sz="2000" baseline="-25000" dirty="0" smtClean="0"/>
+                      <a:t>0</a:t>
+                    </a:r>
+                    <a:r>
+                      <a:rPr lang="en-US" altLang="zh-CN" sz="2000" baseline="-25000" dirty="0" smtClean="0"/>
+                      <a:t>.1 </a:t>
+                    </a:r>
+                    <a:r>
+                      <a:rPr lang="el-GR" altLang="zh-CN" sz="2000" baseline="-25000" dirty="0" smtClean="0"/>
+                      <a:t>μ</a:t>
+                    </a:r>
+                    <a:r>
+                      <a:rPr lang="en-US" altLang="zh-CN" sz="2000" baseline="-25000" dirty="0" smtClean="0"/>
+                      <a:t>m</a:t>
+                    </a:r>
+                    <a:endParaRPr lang="en-US" sz="2000" baseline="-25000" dirty="0"/>
+                  </a:p>
+                </p:txBody>
+              </p:sp>
+              <p:sp>
+                <p:nvSpPr>
+                  <p:cNvPr id="55" name="TextBox 54"/>
+                  <p:cNvSpPr txBox="1"/>
+                  <p:nvPr/>
+                </p:nvSpPr>
+                <p:spPr>
+                  <a:xfrm>
+                    <a:off x="3972926" y="2434604"/>
+                    <a:ext cx="719528" cy="297517"/>
+                  </a:xfrm>
+                  <a:prstGeom prst="rect">
+                    <a:avLst/>
+                  </a:prstGeom>
+                  <a:noFill/>
+                </p:spPr>
+                <p:txBody>
+                  <a:bodyPr wrap="square" rtlCol="0">
+                    <a:spAutoFit/>
+                  </a:bodyPr>
+                  <a:lstStyle/>
+                  <a:p>
+                    <a:r>
+                      <a:rPr lang="en-US" sz="2000" baseline="-25000" dirty="0" smtClean="0"/>
+                      <a:t>3 </a:t>
+                    </a:r>
+                    <a:r>
+                      <a:rPr lang="el-GR" sz="2000" baseline="-25000" dirty="0" smtClean="0"/>
+                      <a:t>μ</a:t>
+                    </a:r>
+                    <a:r>
+                      <a:rPr lang="en-US" sz="2000" baseline="-25000" dirty="0" smtClean="0"/>
+                      <a:t>m</a:t>
+                    </a:r>
+                    <a:endParaRPr lang="en-US" sz="2000" baseline="-25000" dirty="0"/>
+                  </a:p>
+                </p:txBody>
+              </p:sp>
+              <p:cxnSp>
+                <p:nvCxnSpPr>
+                  <p:cNvPr id="45" name="Straight Arrow Connector 44"/>
+                  <p:cNvCxnSpPr/>
+                  <p:nvPr/>
+                </p:nvCxnSpPr>
+                <p:spPr>
+                  <a:xfrm>
+                    <a:off x="4752975" y="962025"/>
+                    <a:ext cx="0" cy="248106"/>
+                  </a:xfrm>
+                  <a:prstGeom prst="straightConnector1">
+                    <a:avLst/>
+                  </a:prstGeom>
+                  <a:ln>
+                    <a:headEnd type="triangle"/>
+                    <a:tailEnd type="triangle"/>
+                  </a:ln>
+                </p:spPr>
+                <p:style>
+                  <a:lnRef idx="1">
+                    <a:schemeClr val="accent1"/>
+                  </a:lnRef>
+                  <a:fillRef idx="0">
+                    <a:schemeClr val="accent1"/>
+                  </a:fillRef>
+                  <a:effectRef idx="0">
+                    <a:schemeClr val="accent1"/>
+                  </a:effectRef>
+                  <a:fontRef idx="minor">
+                    <a:schemeClr val="tx1"/>
+                  </a:fontRef>
+                </p:style>
+              </p:cxnSp>
+              <p:cxnSp>
+                <p:nvCxnSpPr>
+                  <p:cNvPr id="48" name="Straight Arrow Connector 47"/>
+                  <p:cNvCxnSpPr/>
+                  <p:nvPr/>
+                </p:nvCxnSpPr>
+                <p:spPr>
+                  <a:xfrm>
+                    <a:off x="3404235" y="2826587"/>
+                    <a:ext cx="0" cy="183314"/>
+                  </a:xfrm>
+                  <a:prstGeom prst="straightConnector1">
+                    <a:avLst/>
+                  </a:prstGeom>
+                  <a:ln>
+                    <a:headEnd type="triangle"/>
+                    <a:tailEnd type="triangle"/>
+                  </a:ln>
+                </p:spPr>
+                <p:style>
+                  <a:lnRef idx="1">
+                    <a:schemeClr val="accent1"/>
+                  </a:lnRef>
+                  <a:fillRef idx="0">
+                    <a:schemeClr val="accent1"/>
+                  </a:fillRef>
+                  <a:effectRef idx="0">
+                    <a:schemeClr val="accent1"/>
+                  </a:effectRef>
+                  <a:fontRef idx="minor">
+                    <a:schemeClr val="tx1"/>
+                  </a:fontRef>
+                </p:style>
+              </p:cxnSp>
+              <p:cxnSp>
+                <p:nvCxnSpPr>
+                  <p:cNvPr id="53" name="Straight Arrow Connector 52"/>
+                  <p:cNvCxnSpPr/>
+                  <p:nvPr/>
+                </p:nvCxnSpPr>
+                <p:spPr>
+                  <a:xfrm>
+                    <a:off x="3789680" y="2776577"/>
+                    <a:ext cx="957791" cy="0"/>
+                  </a:xfrm>
+                  <a:prstGeom prst="straightConnector1">
+                    <a:avLst/>
+                  </a:prstGeom>
+                  <a:ln>
+                    <a:headEnd type="triangle"/>
+                    <a:tailEnd type="triangle"/>
+                  </a:ln>
+                </p:spPr>
+                <p:style>
+                  <a:lnRef idx="1">
+                    <a:schemeClr val="accent1"/>
+                  </a:lnRef>
+                  <a:fillRef idx="0">
+                    <a:schemeClr val="accent1"/>
+                  </a:fillRef>
+                  <a:effectRef idx="0">
+                    <a:schemeClr val="accent1"/>
+                  </a:effectRef>
+                  <a:fontRef idx="minor">
+                    <a:schemeClr val="tx1"/>
+                  </a:fontRef>
+                </p:style>
+              </p:cxnSp>
+              <p:cxnSp>
+                <p:nvCxnSpPr>
+                  <p:cNvPr id="58" name="Straight Arrow Connector 57"/>
+                  <p:cNvCxnSpPr/>
+                  <p:nvPr/>
+                </p:nvCxnSpPr>
+                <p:spPr>
+                  <a:xfrm>
+                    <a:off x="4894157" y="3511550"/>
+                    <a:ext cx="348294" cy="0"/>
+                  </a:xfrm>
+                  <a:prstGeom prst="straightConnector1">
+                    <a:avLst/>
+                  </a:prstGeom>
+                  <a:ln>
+                    <a:solidFill>
+                      <a:schemeClr val="tx1"/>
+                    </a:solidFill>
+                    <a:headEnd type="triangle"/>
+                    <a:tailEnd type="triangle"/>
+                  </a:ln>
+                </p:spPr>
+                <p:style>
+                  <a:lnRef idx="1">
+                    <a:schemeClr val="accent1"/>
+                  </a:lnRef>
+                  <a:fillRef idx="0">
+                    <a:schemeClr val="accent1"/>
+                  </a:fillRef>
+                  <a:effectRef idx="0">
+                    <a:schemeClr val="accent1"/>
+                  </a:effectRef>
+                  <a:fontRef idx="minor">
+                    <a:schemeClr val="tx1"/>
+                  </a:fontRef>
+                </p:style>
+              </p:cxnSp>
+              <p:sp>
+                <p:nvSpPr>
+                  <p:cNvPr id="59" name="TextBox 58"/>
+                  <p:cNvSpPr txBox="1"/>
+                  <p:nvPr/>
+                </p:nvSpPr>
+                <p:spPr>
+                  <a:xfrm>
+                    <a:off x="4820814" y="3467101"/>
+                    <a:ext cx="494980" cy="215444"/>
+                  </a:xfrm>
+                  <a:prstGeom prst="rect">
+                    <a:avLst/>
+                  </a:prstGeom>
+                  <a:noFill/>
+                </p:spPr>
+                <p:txBody>
+                  <a:bodyPr wrap="square" rtlCol="0">
+                    <a:spAutoFit/>
+                  </a:bodyPr>
+                  <a:lstStyle/>
+                  <a:p>
+                    <a:r>
+                      <a:rPr lang="en-US" sz="1200" baseline="-25000" dirty="0" smtClean="0"/>
+                      <a:t>0</a:t>
+                    </a:r>
+                    <a:r>
+                      <a:rPr lang="en-US" altLang="zh-CN" sz="1200" baseline="-25000" dirty="0" smtClean="0"/>
+                      <a:t>.6</a:t>
+                    </a:r>
+                    <a:r>
+                      <a:rPr lang="en-US" sz="1200" baseline="-25000" dirty="0" smtClean="0"/>
+                      <a:t> </a:t>
+                    </a:r>
+                    <a:r>
+                      <a:rPr lang="el-GR" sz="1200" baseline="-25000" dirty="0" smtClean="0"/>
+                      <a:t>μ</a:t>
+                    </a:r>
+                    <a:r>
+                      <a:rPr lang="en-US" sz="1200" baseline="-25000" dirty="0" smtClean="0"/>
+                      <a:t>m</a:t>
+                    </a:r>
+                    <a:endParaRPr lang="en-US" sz="1200" baseline="-25000" dirty="0"/>
+                  </a:p>
+                </p:txBody>
+              </p:sp>
+              <p:sp>
+                <p:nvSpPr>
+                  <p:cNvPr id="62" name="TextBox 61"/>
+                  <p:cNvSpPr txBox="1"/>
+                  <p:nvPr/>
+                </p:nvSpPr>
+                <p:spPr>
+                  <a:xfrm>
+                    <a:off x="4333875" y="3233853"/>
+                    <a:ext cx="577558" cy="215444"/>
+                  </a:xfrm>
+                  <a:prstGeom prst="rect">
+                    <a:avLst/>
+                  </a:prstGeom>
+                  <a:noFill/>
+                </p:spPr>
+                <p:txBody>
+                  <a:bodyPr wrap="square" rtlCol="0">
+                    <a:spAutoFit/>
+                  </a:bodyPr>
+                  <a:lstStyle/>
+                  <a:p>
+                    <a:r>
+                      <a:rPr lang="en-US" sz="1200" baseline="-25000" dirty="0" smtClean="0"/>
+                      <a:t>0</a:t>
+                    </a:r>
+                    <a:r>
+                      <a:rPr lang="en-US" altLang="zh-CN" sz="1200" baseline="-25000" dirty="0" smtClean="0"/>
+                      <a:t>.22</a:t>
+                    </a:r>
+                    <a:r>
+                      <a:rPr lang="en-US" sz="1200" baseline="-25000" dirty="0" smtClean="0"/>
+                      <a:t> </a:t>
+                    </a:r>
+                    <a:r>
+                      <a:rPr lang="el-GR" sz="1200" baseline="-25000" dirty="0" smtClean="0"/>
+                      <a:t>μ</a:t>
+                    </a:r>
+                    <a:r>
+                      <a:rPr lang="en-US" sz="1200" baseline="-25000" dirty="0" smtClean="0"/>
+                      <a:t>m</a:t>
+                    </a:r>
+                    <a:endParaRPr lang="en-US" sz="1200" baseline="-25000" dirty="0"/>
+                  </a:p>
+                </p:txBody>
+              </p:sp>
+              <p:cxnSp>
+                <p:nvCxnSpPr>
+                  <p:cNvPr id="64" name="Straight Arrow Connector 63"/>
+                  <p:cNvCxnSpPr/>
+                  <p:nvPr/>
+                </p:nvCxnSpPr>
+                <p:spPr>
+                  <a:xfrm>
+                    <a:off x="4820814" y="3242940"/>
+                    <a:ext cx="0" cy="206357"/>
+                  </a:xfrm>
+                  <a:prstGeom prst="straightConnector1">
+                    <a:avLst/>
+                  </a:prstGeom>
+                  <a:ln>
+                    <a:solidFill>
+                      <a:schemeClr val="tx1"/>
+                    </a:solidFill>
+                    <a:headEnd type="triangle"/>
+                    <a:tailEnd type="triangle"/>
+                  </a:ln>
+                </p:spPr>
+                <p:style>
+                  <a:lnRef idx="1">
+                    <a:schemeClr val="accent1"/>
+                  </a:lnRef>
+                  <a:fillRef idx="0">
+                    <a:schemeClr val="accent1"/>
+                  </a:fillRef>
+                  <a:effectRef idx="0">
+                    <a:schemeClr val="accent1"/>
+                  </a:effectRef>
+                  <a:fontRef idx="minor">
+                    <a:schemeClr val="tx1"/>
+                  </a:fontRef>
+                </p:style>
+              </p:cxnSp>
+              <p:sp>
+                <p:nvSpPr>
+                  <p:cNvPr id="68" name="TextBox 67"/>
+                  <p:cNvSpPr txBox="1"/>
+                  <p:nvPr/>
+                </p:nvSpPr>
+                <p:spPr>
+                  <a:xfrm>
+                    <a:off x="4857307" y="2573584"/>
+                    <a:ext cx="721840" cy="400110"/>
+                  </a:xfrm>
+                  <a:prstGeom prst="rect">
+                    <a:avLst/>
+                  </a:prstGeom>
+                  <a:noFill/>
+                </p:spPr>
+                <p:txBody>
+                  <a:bodyPr wrap="square" rtlCol="0">
+                    <a:spAutoFit/>
+                  </a:bodyPr>
+                  <a:lstStyle/>
+                  <a:p>
+                    <a:r>
+                      <a:rPr lang="en-US" sz="2000" dirty="0" err="1" smtClean="0"/>
+                      <a:t>h</a:t>
+                    </a:r>
+                    <a:r>
+                      <a:rPr lang="en-US" sz="2000" baseline="-25000" dirty="0" err="1" smtClean="0"/>
+                      <a:t>mqw</a:t>
+                    </a:r>
+                    <a:endParaRPr lang="en-US" sz="2000" baseline="-25000" dirty="0"/>
+                  </a:p>
+                </p:txBody>
+              </p:sp>
+              <p:sp>
+                <p:nvSpPr>
+                  <p:cNvPr id="70" name="TextBox 69"/>
+                  <p:cNvSpPr txBox="1"/>
+                  <p:nvPr/>
+                </p:nvSpPr>
+                <p:spPr>
+                  <a:xfrm>
+                    <a:off x="5896291" y="2151681"/>
+                    <a:ext cx="1106489" cy="276999"/>
+                  </a:xfrm>
+                  <a:prstGeom prst="rect">
+                    <a:avLst/>
+                  </a:prstGeom>
+                  <a:noFill/>
+                </p:spPr>
+                <p:txBody>
+                  <a:bodyPr wrap="square" rtlCol="0">
+                    <a:spAutoFit/>
+                  </a:bodyPr>
+                  <a:lstStyle/>
+                  <a:p>
+                    <a:pPr algn="ctr"/>
+                    <a:r>
+                      <a:rPr lang="en-US" altLang="zh-CN" sz="1200" dirty="0" smtClean="0"/>
+                      <a:t>Ground Metal</a:t>
+                    </a:r>
+                    <a:endParaRPr lang="en-US" sz="1200" dirty="0"/>
+                  </a:p>
+                </p:txBody>
+              </p:sp>
+            </p:grpSp>
+            <p:cxnSp>
+              <p:nvCxnSpPr>
+                <p:cNvPr id="67" name="Straight Arrow Connector 66"/>
+                <p:cNvCxnSpPr/>
+                <p:nvPr/>
+              </p:nvCxnSpPr>
+              <p:spPr>
+                <a:xfrm>
+                  <a:off x="4503632" y="2430780"/>
+                  <a:ext cx="0" cy="156211"/>
+                </a:xfrm>
+                <a:prstGeom prst="straightConnector1">
+                  <a:avLst/>
+                </a:prstGeom>
+                <a:ln>
+                  <a:headEnd type="triangle" w="sm" len="sm"/>
+                  <a:tailEnd type="triangle" w="sm" len="sm"/>
+                </a:ln>
+              </p:spPr>
+              <p:style>
+                <a:lnRef idx="1">
+                  <a:schemeClr val="accent1"/>
+                </a:lnRef>
+                <a:fillRef idx="0">
+                  <a:schemeClr val="accent1"/>
+                </a:fillRef>
+                <a:effectRef idx="0">
+                  <a:schemeClr val="accent1"/>
+                </a:effectRef>
+                <a:fontRef idx="minor">
+                  <a:schemeClr val="tx1"/>
+                </a:fontRef>
+              </p:style>
+            </p:cxnSp>
+          </p:grpSp>
+          <p:cxnSp>
+            <p:nvCxnSpPr>
+              <p:cNvPr id="72" name="Straight Arrow Connector 71"/>
+              <p:cNvCxnSpPr>
+                <a:stCxn id="29" idx="0"/>
+              </p:cNvCxnSpPr>
+              <p:nvPr/>
+            </p:nvCxnSpPr>
+            <p:spPr>
+              <a:xfrm flipH="1" flipV="1">
+                <a:off x="6333672" y="2458616"/>
+                <a:ext cx="54928" cy="394663"/>
+              </a:xfrm>
+              <a:prstGeom prst="straightConnector1">
+                <a:avLst/>
+              </a:prstGeom>
+              <a:ln>
+                <a:solidFill>
+                  <a:schemeClr val="tx1"/>
+                </a:solidFill>
+                <a:tailEnd type="triangle"/>
+              </a:ln>
+            </p:spPr>
+            <p:style>
+              <a:lnRef idx="1">
+                <a:schemeClr val="accent1"/>
+              </a:lnRef>
+              <a:fillRef idx="0">
+                <a:schemeClr val="accent1"/>
+              </a:fillRef>
+              <a:effectRef idx="0">
+                <a:schemeClr val="accent1"/>
+              </a:effectRef>
+              <a:fontRef idx="minor">
+                <a:schemeClr val="tx1"/>
+              </a:fontRef>
+            </p:style>
+          </p:cxnSp>
+        </p:grpSp>
+        <p:pic>
+          <p:nvPicPr>
+            <p:cNvPr id="74" name="Picture 73"/>
+            <p:cNvPicPr>
+              <a:picLocks noChangeAspect="1"/>
+            </p:cNvPicPr>
+            <p:nvPr/>
+          </p:nvPicPr>
+          <p:blipFill>
+            <a:blip r:embed="rId2">
+              <a:extLst>
+                <a:ext uri="{28A0092B-C50C-407E-A947-70E740481C1C}">
+                  <a14:useLocalDpi xmlns:a14="http://schemas.microsoft.com/office/drawing/2010/main" val="0"/>
+                </a:ext>
+              </a:extLst>
+            </a:blip>
+            <a:stretch>
+              <a:fillRect/>
+            </a:stretch>
+          </p:blipFill>
+          <p:spPr>
+            <a:xfrm>
+              <a:off x="6155489" y="751114"/>
+              <a:ext cx="3467401" cy="4588527"/>
+            </a:xfrm>
+            <a:prstGeom prst="rect">
+              <a:avLst/>
+            </a:prstGeom>
+          </p:spPr>
+        </p:pic>
+        <p:sp>
+          <p:nvSpPr>
+            <p:cNvPr id="75" name="TextBox 74"/>
+            <p:cNvSpPr txBox="1"/>
+            <p:nvPr/>
+          </p:nvSpPr>
+          <p:spPr>
+            <a:xfrm>
+              <a:off x="1983014" y="671660"/>
+              <a:ext cx="455386" cy="369332"/>
+            </a:xfrm>
+            <a:prstGeom prst="rect">
+              <a:avLst/>
+            </a:prstGeom>
+            <a:noFill/>
+          </p:spPr>
+          <p:txBody>
+            <a:bodyPr wrap="square" rtlCol="0">
+              <a:spAutoFit/>
+            </a:bodyPr>
+            <a:lstStyle/>
+            <a:p>
+              <a:r>
+                <a:rPr lang="en-US" dirty="0" smtClean="0"/>
+                <a:t>(a)</a:t>
+              </a:r>
+              <a:endParaRPr lang="en-US" dirty="0"/>
+            </a:p>
+          </p:txBody>
+        </p:sp>
+        <p:sp>
+          <p:nvSpPr>
+            <p:cNvPr id="76" name="TextBox 75"/>
+            <p:cNvSpPr txBox="1"/>
+            <p:nvPr/>
+          </p:nvSpPr>
+          <p:spPr>
+            <a:xfrm>
+              <a:off x="5710057" y="671660"/>
+              <a:ext cx="455386" cy="369332"/>
+            </a:xfrm>
+            <a:prstGeom prst="rect">
+              <a:avLst/>
+            </a:prstGeom>
+            <a:noFill/>
+          </p:spPr>
+          <p:txBody>
+            <a:bodyPr wrap="square" rtlCol="0">
+              <a:spAutoFit/>
+            </a:bodyPr>
+            <a:lstStyle/>
+            <a:p>
+              <a:r>
+                <a:rPr lang="en-US" dirty="0" smtClean="0"/>
+                <a:t>(b)</a:t>
+              </a:r>
+              <a:endParaRPr lang="en-US" dirty="0"/>
+            </a:p>
+          </p:txBody>
+        </p:sp>
+      </p:grpSp>
+    </p:spTree>
+    <p:extLst>
+      <p:ext uri="{BB962C8B-B14F-4D97-AF65-F5344CB8AC3E}">
+        <p14:creationId xmlns:p14="http://schemas.microsoft.com/office/powerpoint/2010/main" val="3436000658"/>
+      </p:ext>
+    </p:extLst>
+  </p:cSld>
+  <p:clrMapOvr>
+    <a:masterClrMapping/>
+  </p:clrMapOvr>
+</p:sld>
+</file>
+
+<file path=ppt/slides/slide12.xml><?xml version="1.0" encoding="utf-8"?>
+<p:sld xmlns:a="http://schemas.openxmlformats.org/drawingml/2006/main" xmlns:r="http://schemas.openxmlformats.org/officeDocument/2006/relationships" xmlns:p="http://schemas.openxmlformats.org/presentationml/2006/main">
+  <p:cSld>
+    <p:spTree>
+      <p:nvGrpSpPr>
+        <p:cNvPr id="1" name=""/>
+        <p:cNvGrpSpPr/>
+        <p:nvPr/>
+      </p:nvGrpSpPr>
+      <p:grpSpPr>
+        <a:xfrm>
+          <a:off x="0" y="0"/>
+          <a:ext cx="0" cy="0"/>
+          <a:chOff x="0" y="0"/>
+          <a:chExt cx="0" cy="0"/>
+        </a:xfrm>
+      </p:grpSpPr>
+      <p:grpSp>
+        <p:nvGrpSpPr>
+          <p:cNvPr id="10" name="Group 9"/>
+          <p:cNvGrpSpPr/>
+          <p:nvPr/>
+        </p:nvGrpSpPr>
+        <p:grpSpPr>
+          <a:xfrm>
+            <a:off x="683417" y="1467926"/>
+            <a:ext cx="10605502" cy="4526477"/>
+            <a:chOff x="683417" y="1467926"/>
+            <a:chExt cx="10605502" cy="4526477"/>
+          </a:xfrm>
+        </p:grpSpPr>
+        <p:pic>
+          <p:nvPicPr>
+            <p:cNvPr id="4" name="Picture 3"/>
+            <p:cNvPicPr>
+              <a:picLocks noChangeAspect="1"/>
+            </p:cNvPicPr>
+            <p:nvPr/>
+          </p:nvPicPr>
+          <p:blipFill>
+            <a:blip r:embed="rId2">
+              <a:extLst>
+                <a:ext uri="{28A0092B-C50C-407E-A947-70E740481C1C}">
+                  <a14:useLocalDpi xmlns:a14="http://schemas.microsoft.com/office/drawing/2010/main" val="0"/>
+                </a:ext>
+              </a:extLst>
+            </a:blip>
+            <a:stretch>
+              <a:fillRect/>
+            </a:stretch>
+          </p:blipFill>
+          <p:spPr>
+            <a:xfrm>
+              <a:off x="683417" y="1467926"/>
+              <a:ext cx="5133184" cy="4210425"/>
+            </a:xfrm>
+            <a:prstGeom prst="rect">
+              <a:avLst/>
+            </a:prstGeom>
+          </p:spPr>
+        </p:pic>
+        <p:grpSp>
+          <p:nvGrpSpPr>
+            <p:cNvPr id="7" name="Group 6"/>
+            <p:cNvGrpSpPr/>
+            <p:nvPr/>
+          </p:nvGrpSpPr>
+          <p:grpSpPr>
+            <a:xfrm>
+              <a:off x="6055181" y="2499847"/>
+              <a:ext cx="5233738" cy="2333410"/>
+              <a:chOff x="6055181" y="2499847"/>
+              <a:chExt cx="5233738" cy="2333410"/>
+            </a:xfrm>
+          </p:grpSpPr>
+          <p:pic>
+            <p:nvPicPr>
+              <p:cNvPr id="5" name="图片 6"/>
+              <p:cNvPicPr>
+                <a:picLocks noChangeAspect="1"/>
+              </p:cNvPicPr>
+              <p:nvPr/>
+            </p:nvPicPr>
+            <p:blipFill>
+              <a:blip r:embed="rId3"/>
+              <a:stretch>
+                <a:fillRect/>
+              </a:stretch>
+            </p:blipFill>
+            <p:spPr>
+              <a:xfrm>
+                <a:off x="6055181" y="2499847"/>
+                <a:ext cx="5233738" cy="2333410"/>
+              </a:xfrm>
+              <a:prstGeom prst="rect">
+                <a:avLst/>
+              </a:prstGeom>
+            </p:spPr>
+          </p:pic>
+          <p:sp>
+            <p:nvSpPr>
+              <p:cNvPr id="6" name="文本框 5"/>
+              <p:cNvSpPr txBox="1"/>
+              <p:nvPr/>
+            </p:nvSpPr>
+            <p:spPr>
+              <a:xfrm>
+                <a:off x="7039429" y="3660455"/>
+                <a:ext cx="1212077" cy="523220"/>
+              </a:xfrm>
+              <a:prstGeom prst="rect">
+                <a:avLst/>
+              </a:prstGeom>
+              <a:noFill/>
+              <a:ln>
+                <a:solidFill>
+                  <a:schemeClr val="tx1"/>
+                </a:solidFill>
+              </a:ln>
+            </p:spPr>
+            <p:txBody>
+              <a:bodyPr wrap="square" rtlCol="0">
+                <a:spAutoFit/>
+              </a:bodyPr>
+              <a:lstStyle/>
+              <a:p>
+                <a:r>
+                  <a:rPr lang="en-US" altLang="zh-CN" sz="2800" i="1" dirty="0" err="1" smtClean="0">
+                    <a:latin typeface="Times New Roman" panose="02020603050405020304" pitchFamily="18" charset="0"/>
+                    <a:cs typeface="Times New Roman" panose="02020603050405020304" pitchFamily="18" charset="0"/>
+                  </a:rPr>
+                  <a:t>Zc</a:t>
+                </a:r>
+                <a:r>
+                  <a:rPr lang="en-US" altLang="zh-CN" sz="2800" i="1" dirty="0" smtClean="0">
+                    <a:latin typeface="Times New Roman" panose="02020603050405020304" pitchFamily="18" charset="0"/>
+                    <a:cs typeface="Times New Roman" panose="02020603050405020304" pitchFamily="18" charset="0"/>
+                  </a:rPr>
+                  <a:t>, </a:t>
+                </a:r>
+                <a:r>
+                  <a:rPr lang="en-US" sz="2800" i="1" dirty="0" err="1" smtClean="0">
+                    <a:latin typeface="Times New Roman" panose="02020603050405020304" pitchFamily="18" charset="0"/>
+                    <a:cs typeface="Times New Roman" panose="02020603050405020304" pitchFamily="18" charset="0"/>
+                  </a:rPr>
+                  <a:t>γ</a:t>
+                </a:r>
+                <a:r>
+                  <a:rPr lang="en-US" sz="2800" i="1" baseline="-25000" dirty="0" err="1" smtClean="0">
+                    <a:latin typeface="Times New Roman" panose="02020603050405020304" pitchFamily="18" charset="0"/>
+                    <a:cs typeface="Times New Roman" panose="02020603050405020304" pitchFamily="18" charset="0"/>
+                  </a:rPr>
+                  <a:t>m</a:t>
+                </a:r>
+                <a:endParaRPr lang="en-US" sz="2800" i="1" baseline="-25000" dirty="0" smtClean="0">
+                  <a:latin typeface="Times New Roman" panose="02020603050405020304" pitchFamily="18" charset="0"/>
+                  <a:cs typeface="Times New Roman" panose="02020603050405020304" pitchFamily="18" charset="0"/>
+                </a:endParaRPr>
+              </a:p>
+            </p:txBody>
+          </p:sp>
+        </p:grpSp>
+        <p:sp>
+          <p:nvSpPr>
+            <p:cNvPr id="8" name="TextBox 7"/>
+            <p:cNvSpPr txBox="1"/>
+            <p:nvPr/>
+          </p:nvSpPr>
+          <p:spPr>
+            <a:xfrm>
+              <a:off x="3003267" y="5617031"/>
+              <a:ext cx="493485" cy="377372"/>
+            </a:xfrm>
+            <a:prstGeom prst="rect">
+              <a:avLst/>
+            </a:prstGeom>
+            <a:noFill/>
+          </p:spPr>
+          <p:txBody>
+            <a:bodyPr wrap="square" rtlCol="0">
+              <a:spAutoFit/>
+            </a:bodyPr>
+            <a:lstStyle/>
+            <a:p>
+              <a:r>
+                <a:rPr lang="en-US" dirty="0" smtClean="0"/>
+                <a:t>(a)</a:t>
+              </a:r>
+              <a:endParaRPr lang="en-US" dirty="0"/>
+            </a:p>
+          </p:txBody>
+        </p:sp>
+        <p:sp>
+          <p:nvSpPr>
+            <p:cNvPr id="9" name="TextBox 8"/>
+            <p:cNvSpPr txBox="1"/>
+            <p:nvPr/>
+          </p:nvSpPr>
+          <p:spPr>
+            <a:xfrm>
+              <a:off x="8425307" y="5617031"/>
+              <a:ext cx="493485" cy="377372"/>
+            </a:xfrm>
+            <a:prstGeom prst="rect">
+              <a:avLst/>
+            </a:prstGeom>
+            <a:noFill/>
+          </p:spPr>
+          <p:txBody>
+            <a:bodyPr wrap="square" rtlCol="0">
+              <a:spAutoFit/>
+            </a:bodyPr>
+            <a:lstStyle/>
+            <a:p>
+              <a:r>
+                <a:rPr lang="en-US" dirty="0" smtClean="0"/>
+                <a:t>(b)</a:t>
+              </a:r>
+              <a:endParaRPr lang="en-US" dirty="0"/>
+            </a:p>
+          </p:txBody>
+        </p:sp>
+      </p:grpSp>
+    </p:spTree>
+    <p:extLst>
+      <p:ext uri="{BB962C8B-B14F-4D97-AF65-F5344CB8AC3E}">
+        <p14:creationId xmlns:p14="http://schemas.microsoft.com/office/powerpoint/2010/main" val="2241898735"/>
+      </p:ext>
+    </p:extLst>
+  </p:cSld>
+  <p:clrMapOvr>
+    <a:masterClrMapping/>
+  </p:clrMapOvr>
+</p:sld>
+</file>
+
 <file path=ppt/slides/slide2.xml><?xml version="1.0" encoding="utf-8"?>
 <p:sld xmlns:a="http://schemas.openxmlformats.org/drawingml/2006/main" xmlns:r="http://schemas.openxmlformats.org/officeDocument/2006/relationships" xmlns:p="http://schemas.openxmlformats.org/presentationml/2006/main">
   <p:cSld>
@@ -6266,19 +9899,7 @@
               </a:r>
               <a:r>
                 <a:rPr lang="zh-CN" altLang="en-US" dirty="0" smtClean="0"/>
-                <a:t>带</a:t>
-              </a:r>
-              <a:r>
-                <a:rPr lang="zh-CN" altLang="en-US" dirty="0" smtClean="0"/>
-                <a:t>间跃迁的吸</a:t>
-              </a:r>
-              <a:r>
-                <a:rPr lang="zh-CN" altLang="en-US" dirty="0" smtClean="0"/>
-                <a:t>收</a:t>
-              </a:r>
-              <a:r>
-                <a:rPr lang="zh-CN" altLang="en-US" dirty="0" smtClean="0"/>
-                <a:t>谱</a:t>
+                <a:t>带间跃迁的吸收谱</a:t>
               </a:r>
               <a:endParaRPr lang="en-US" altLang="zh-CN" dirty="0" smtClean="0"/>
             </a:p>
@@ -12027,10 +15648,656 @@
           <a:chExt cx="0" cy="0"/>
         </a:xfrm>
       </p:grpSpPr>
+      <p:grpSp>
+        <p:nvGrpSpPr>
+          <p:cNvPr id="4" name="Group 3"/>
+          <p:cNvGrpSpPr/>
+          <p:nvPr/>
+        </p:nvGrpSpPr>
+        <p:grpSpPr>
+          <a:xfrm>
+            <a:off x="3830955" y="1071976"/>
+            <a:ext cx="3004820" cy="2110437"/>
+            <a:chOff x="1211580" y="1729201"/>
+            <a:chExt cx="3004820" cy="2110437"/>
+          </a:xfrm>
+        </p:grpSpPr>
+        <p:grpSp>
+          <p:nvGrpSpPr>
+            <p:cNvPr id="5" name="Group 4"/>
+            <p:cNvGrpSpPr/>
+            <p:nvPr/>
+          </p:nvGrpSpPr>
+          <p:grpSpPr>
+            <a:xfrm>
+              <a:off x="1211580" y="1813560"/>
+              <a:ext cx="1965960" cy="1943102"/>
+              <a:chOff x="728207" y="1813560"/>
+              <a:chExt cx="2449333" cy="1943102"/>
+            </a:xfrm>
+          </p:grpSpPr>
+          <p:pic>
+            <p:nvPicPr>
+              <p:cNvPr id="18" name="Picture 17"/>
+              <p:cNvPicPr>
+                <a:picLocks noChangeAspect="1"/>
+              </p:cNvPicPr>
+              <p:nvPr/>
+            </p:nvPicPr>
+            <p:blipFill>
+              <a:blip r:embed="rId2"/>
+              <a:stretch>
+                <a:fillRect/>
+              </a:stretch>
+            </p:blipFill>
+            <p:spPr>
+              <a:xfrm>
+                <a:off x="728207" y="1821543"/>
+                <a:ext cx="2447925" cy="1736998"/>
+              </a:xfrm>
+              <a:prstGeom prst="rect">
+                <a:avLst/>
+              </a:prstGeom>
+            </p:spPr>
+          </p:pic>
+          <p:sp>
+            <p:nvSpPr>
+              <p:cNvPr id="19" name="Rectangle 18"/>
+              <p:cNvSpPr/>
+              <p:nvPr/>
+            </p:nvSpPr>
+            <p:spPr>
+              <a:xfrm>
+                <a:off x="731520" y="1813560"/>
+                <a:ext cx="2446020" cy="106680"/>
+              </a:xfrm>
+              <a:prstGeom prst="rect">
+                <a:avLst/>
+              </a:prstGeom>
+              <a:solidFill>
+                <a:schemeClr val="accent4">
+                  <a:lumMod val="75000"/>
+                </a:schemeClr>
+              </a:solidFill>
+              <a:ln>
+                <a:noFill/>
+              </a:ln>
+            </p:spPr>
+            <p:style>
+              <a:lnRef idx="2">
+                <a:schemeClr val="accent1">
+                  <a:shade val="50000"/>
+                </a:schemeClr>
+              </a:lnRef>
+              <a:fillRef idx="1">
+                <a:schemeClr val="accent1"/>
+              </a:fillRef>
+              <a:effectRef idx="0">
+                <a:schemeClr val="accent1"/>
+              </a:effectRef>
+              <a:fontRef idx="minor">
+                <a:schemeClr val="lt1"/>
+              </a:fontRef>
+            </p:style>
+            <p:txBody>
+              <a:bodyPr rtlCol="0" anchor="ctr"/>
+              <a:lstStyle/>
+              <a:p>
+                <a:pPr algn="ctr"/>
+                <a:endParaRPr lang="en-US"/>
+              </a:p>
+            </p:txBody>
+          </p:sp>
+          <p:sp>
+            <p:nvSpPr>
+              <p:cNvPr id="20" name="Rectangle 19"/>
+              <p:cNvSpPr/>
+              <p:nvPr/>
+            </p:nvSpPr>
+            <p:spPr>
+              <a:xfrm>
+                <a:off x="730112" y="3147060"/>
+                <a:ext cx="2446020" cy="160020"/>
+              </a:xfrm>
+              <a:prstGeom prst="rect">
+                <a:avLst/>
+              </a:prstGeom>
+              <a:solidFill>
+                <a:srgbClr val="FF0000"/>
+              </a:solidFill>
+              <a:ln>
+                <a:noFill/>
+              </a:ln>
+            </p:spPr>
+            <p:style>
+              <a:lnRef idx="2">
+                <a:schemeClr val="accent1">
+                  <a:shade val="50000"/>
+                </a:schemeClr>
+              </a:lnRef>
+              <a:fillRef idx="1">
+                <a:schemeClr val="accent1"/>
+              </a:fillRef>
+              <a:effectRef idx="0">
+                <a:schemeClr val="accent1"/>
+              </a:effectRef>
+              <a:fontRef idx="minor">
+                <a:schemeClr val="lt1"/>
+              </a:fontRef>
+            </p:style>
+            <p:txBody>
+              <a:bodyPr rtlCol="0" anchor="ctr"/>
+              <a:lstStyle/>
+              <a:p>
+                <a:pPr algn="ctr"/>
+                <a:endParaRPr lang="en-US"/>
+              </a:p>
+            </p:txBody>
+          </p:sp>
+          <p:sp>
+            <p:nvSpPr>
+              <p:cNvPr id="21" name="Rectangle 20"/>
+              <p:cNvSpPr/>
+              <p:nvPr/>
+            </p:nvSpPr>
+            <p:spPr>
+              <a:xfrm>
+                <a:off x="730112" y="3463291"/>
+                <a:ext cx="2446020" cy="137160"/>
+              </a:xfrm>
+              <a:prstGeom prst="rect">
+                <a:avLst/>
+              </a:prstGeom>
+              <a:solidFill>
+                <a:srgbClr val="FF0000"/>
+              </a:solidFill>
+              <a:ln>
+                <a:noFill/>
+              </a:ln>
+            </p:spPr>
+            <p:style>
+              <a:lnRef idx="2">
+                <a:schemeClr val="accent1">
+                  <a:shade val="50000"/>
+                </a:schemeClr>
+              </a:lnRef>
+              <a:fillRef idx="1">
+                <a:schemeClr val="accent1"/>
+              </a:fillRef>
+              <a:effectRef idx="0">
+                <a:schemeClr val="accent1"/>
+              </a:effectRef>
+              <a:fontRef idx="minor">
+                <a:schemeClr val="lt1"/>
+              </a:fontRef>
+            </p:style>
+            <p:txBody>
+              <a:bodyPr rtlCol="0" anchor="ctr"/>
+              <a:lstStyle/>
+              <a:p>
+                <a:pPr algn="ctr"/>
+                <a:endParaRPr lang="en-US"/>
+              </a:p>
+            </p:txBody>
+          </p:sp>
+          <p:sp>
+            <p:nvSpPr>
+              <p:cNvPr id="22" name="Rectangle 21"/>
+              <p:cNvSpPr/>
+              <p:nvPr/>
+            </p:nvSpPr>
+            <p:spPr>
+              <a:xfrm>
+                <a:off x="728207" y="3600451"/>
+                <a:ext cx="2447925" cy="156211"/>
+              </a:xfrm>
+              <a:prstGeom prst="rect">
+                <a:avLst/>
+              </a:prstGeom>
+              <a:solidFill>
+                <a:schemeClr val="accent4">
+                  <a:lumMod val="50000"/>
+                </a:schemeClr>
+              </a:solidFill>
+              <a:ln>
+                <a:noFill/>
+              </a:ln>
+            </p:spPr>
+            <p:style>
+              <a:lnRef idx="2">
+                <a:schemeClr val="accent1">
+                  <a:shade val="50000"/>
+                </a:schemeClr>
+              </a:lnRef>
+              <a:fillRef idx="1">
+                <a:schemeClr val="accent1"/>
+              </a:fillRef>
+              <a:effectRef idx="0">
+                <a:schemeClr val="accent1"/>
+              </a:effectRef>
+              <a:fontRef idx="minor">
+                <a:schemeClr val="lt1"/>
+              </a:fontRef>
+            </p:style>
+            <p:txBody>
+              <a:bodyPr rtlCol="0" anchor="ctr"/>
+              <a:lstStyle/>
+              <a:p>
+                <a:pPr algn="ctr"/>
+                <a:endParaRPr lang="en-US"/>
+              </a:p>
+            </p:txBody>
+          </p:sp>
+        </p:grpSp>
+        <p:cxnSp>
+          <p:nvCxnSpPr>
+            <p:cNvPr id="6" name="Straight Arrow Connector 5"/>
+            <p:cNvCxnSpPr/>
+            <p:nvPr/>
+          </p:nvCxnSpPr>
+          <p:spPr>
+            <a:xfrm>
+              <a:off x="3176410" y="1860006"/>
+              <a:ext cx="366890" cy="0"/>
+            </a:xfrm>
+            <a:prstGeom prst="straightConnector1">
+              <a:avLst/>
+            </a:prstGeom>
+            <a:ln>
+              <a:solidFill>
+                <a:schemeClr val="tx1"/>
+              </a:solidFill>
+              <a:tailEnd type="triangle"/>
+            </a:ln>
+          </p:spPr>
+          <p:style>
+            <a:lnRef idx="1">
+              <a:schemeClr val="accent1"/>
+            </a:lnRef>
+            <a:fillRef idx="0">
+              <a:schemeClr val="accent1"/>
+            </a:fillRef>
+            <a:effectRef idx="0">
+              <a:schemeClr val="accent1"/>
+            </a:effectRef>
+            <a:fontRef idx="minor">
+              <a:schemeClr val="tx1"/>
+            </a:fontRef>
+          </p:style>
+        </p:cxnSp>
+        <p:sp>
+          <p:nvSpPr>
+            <p:cNvPr id="7" name="TextBox 6"/>
+            <p:cNvSpPr txBox="1"/>
+            <p:nvPr/>
+          </p:nvSpPr>
+          <p:spPr>
+            <a:xfrm>
+              <a:off x="3543300" y="1729201"/>
+              <a:ext cx="673100" cy="276999"/>
+            </a:xfrm>
+            <a:prstGeom prst="rect">
+              <a:avLst/>
+            </a:prstGeom>
+            <a:noFill/>
+          </p:spPr>
+          <p:txBody>
+            <a:bodyPr wrap="square" rtlCol="0">
+              <a:spAutoFit/>
+            </a:bodyPr>
+            <a:lstStyle/>
+            <a:p>
+              <a:r>
+                <a:rPr lang="en-US" altLang="zh-CN" sz="1200" dirty="0" err="1" smtClean="0"/>
+                <a:t>InGaAs</a:t>
+              </a:r>
+              <a:endParaRPr lang="en-US" sz="1200" dirty="0"/>
+            </a:p>
+          </p:txBody>
+        </p:sp>
+        <p:sp>
+          <p:nvSpPr>
+            <p:cNvPr id="8" name="TextBox 7"/>
+            <p:cNvSpPr txBox="1"/>
+            <p:nvPr/>
+          </p:nvSpPr>
+          <p:spPr>
+            <a:xfrm>
+              <a:off x="3543300" y="2186401"/>
+              <a:ext cx="673100" cy="276999"/>
+            </a:xfrm>
+            <a:prstGeom prst="rect">
+              <a:avLst/>
+            </a:prstGeom>
+            <a:noFill/>
+          </p:spPr>
+          <p:txBody>
+            <a:bodyPr wrap="square" rtlCol="0">
+              <a:spAutoFit/>
+            </a:bodyPr>
+            <a:lstStyle/>
+            <a:p>
+              <a:r>
+                <a:rPr lang="en-US" altLang="zh-CN" sz="1200" dirty="0" smtClean="0"/>
+                <a:t>p-</a:t>
+              </a:r>
+              <a:r>
+                <a:rPr lang="en-US" altLang="zh-CN" sz="1200" dirty="0" err="1" smtClean="0"/>
+                <a:t>InP</a:t>
+              </a:r>
+              <a:endParaRPr lang="en-US" sz="1200" dirty="0"/>
+            </a:p>
+          </p:txBody>
+        </p:sp>
+        <p:cxnSp>
+          <p:nvCxnSpPr>
+            <p:cNvPr id="9" name="Straight Arrow Connector 8"/>
+            <p:cNvCxnSpPr/>
+            <p:nvPr/>
+          </p:nvCxnSpPr>
+          <p:spPr>
+            <a:xfrm>
+              <a:off x="3176410" y="2317206"/>
+              <a:ext cx="366890" cy="0"/>
+            </a:xfrm>
+            <a:prstGeom prst="straightConnector1">
+              <a:avLst/>
+            </a:prstGeom>
+            <a:ln>
+              <a:solidFill>
+                <a:schemeClr val="tx1"/>
+              </a:solidFill>
+              <a:tailEnd type="triangle"/>
+            </a:ln>
+          </p:spPr>
+          <p:style>
+            <a:lnRef idx="1">
+              <a:schemeClr val="accent1"/>
+            </a:lnRef>
+            <a:fillRef idx="0">
+              <a:schemeClr val="accent1"/>
+            </a:fillRef>
+            <a:effectRef idx="0">
+              <a:schemeClr val="accent1"/>
+            </a:effectRef>
+            <a:fontRef idx="minor">
+              <a:schemeClr val="tx1"/>
+            </a:fontRef>
+          </p:style>
+        </p:cxnSp>
+        <p:cxnSp>
+          <p:nvCxnSpPr>
+            <p:cNvPr id="10" name="Straight Arrow Connector 9"/>
+            <p:cNvCxnSpPr/>
+            <p:nvPr/>
+          </p:nvCxnSpPr>
+          <p:spPr>
+            <a:xfrm>
+              <a:off x="3176410" y="3231606"/>
+              <a:ext cx="366890" cy="0"/>
+            </a:xfrm>
+            <a:prstGeom prst="straightConnector1">
+              <a:avLst/>
+            </a:prstGeom>
+            <a:ln>
+              <a:solidFill>
+                <a:schemeClr val="tx1"/>
+              </a:solidFill>
+              <a:tailEnd type="triangle"/>
+            </a:ln>
+          </p:spPr>
+          <p:style>
+            <a:lnRef idx="1">
+              <a:schemeClr val="accent1"/>
+            </a:lnRef>
+            <a:fillRef idx="0">
+              <a:schemeClr val="accent1"/>
+            </a:fillRef>
+            <a:effectRef idx="0">
+              <a:schemeClr val="accent1"/>
+            </a:effectRef>
+            <a:fontRef idx="minor">
+              <a:schemeClr val="tx1"/>
+            </a:fontRef>
+          </p:style>
+        </p:cxnSp>
+        <p:cxnSp>
+          <p:nvCxnSpPr>
+            <p:cNvPr id="11" name="Straight Arrow Connector 10"/>
+            <p:cNvCxnSpPr/>
+            <p:nvPr/>
+          </p:nvCxnSpPr>
+          <p:spPr>
+            <a:xfrm>
+              <a:off x="3176410" y="3558540"/>
+              <a:ext cx="366890" cy="0"/>
+            </a:xfrm>
+            <a:prstGeom prst="straightConnector1">
+              <a:avLst/>
+            </a:prstGeom>
+            <a:ln>
+              <a:solidFill>
+                <a:schemeClr val="tx1"/>
+              </a:solidFill>
+              <a:tailEnd type="triangle"/>
+            </a:ln>
+          </p:spPr>
+          <p:style>
+            <a:lnRef idx="1">
+              <a:schemeClr val="accent1"/>
+            </a:lnRef>
+            <a:fillRef idx="0">
+              <a:schemeClr val="accent1"/>
+            </a:fillRef>
+            <a:effectRef idx="0">
+              <a:schemeClr val="accent1"/>
+            </a:effectRef>
+            <a:fontRef idx="minor">
+              <a:schemeClr val="tx1"/>
+            </a:fontRef>
+          </p:style>
+        </p:cxnSp>
+        <p:sp>
+          <p:nvSpPr>
+            <p:cNvPr id="12" name="TextBox 11"/>
+            <p:cNvSpPr txBox="1"/>
+            <p:nvPr/>
+          </p:nvSpPr>
+          <p:spPr>
+            <a:xfrm>
+              <a:off x="3543300" y="3065017"/>
+              <a:ext cx="673100" cy="276999"/>
+            </a:xfrm>
+            <a:prstGeom prst="rect">
+              <a:avLst/>
+            </a:prstGeom>
+            <a:noFill/>
+          </p:spPr>
+          <p:txBody>
+            <a:bodyPr wrap="square" rtlCol="0">
+              <a:spAutoFit/>
+            </a:bodyPr>
+            <a:lstStyle/>
+            <a:p>
+              <a:r>
+                <a:rPr lang="en-US" altLang="zh-CN" sz="1200" dirty="0" smtClean="0"/>
+                <a:t>SCH</a:t>
+              </a:r>
+              <a:endParaRPr lang="en-US" sz="1200" dirty="0"/>
+            </a:p>
+          </p:txBody>
+        </p:sp>
+        <p:sp>
+          <p:nvSpPr>
+            <p:cNvPr id="13" name="TextBox 12"/>
+            <p:cNvSpPr txBox="1"/>
+            <p:nvPr/>
+          </p:nvSpPr>
+          <p:spPr>
+            <a:xfrm>
+              <a:off x="3543300" y="3420041"/>
+              <a:ext cx="673100" cy="276999"/>
+            </a:xfrm>
+            <a:prstGeom prst="rect">
+              <a:avLst/>
+            </a:prstGeom>
+            <a:noFill/>
+          </p:spPr>
+          <p:txBody>
+            <a:bodyPr wrap="square" rtlCol="0">
+              <a:spAutoFit/>
+            </a:bodyPr>
+            <a:lstStyle/>
+            <a:p>
+              <a:r>
+                <a:rPr lang="en-US" altLang="zh-CN" sz="1200" dirty="0" smtClean="0"/>
+                <a:t>SCH</a:t>
+              </a:r>
+              <a:endParaRPr lang="en-US" sz="1200" dirty="0"/>
+            </a:p>
+          </p:txBody>
+        </p:sp>
+        <p:cxnSp>
+          <p:nvCxnSpPr>
+            <p:cNvPr id="14" name="Straight Arrow Connector 13"/>
+            <p:cNvCxnSpPr/>
+            <p:nvPr/>
+          </p:nvCxnSpPr>
+          <p:spPr>
+            <a:xfrm>
+              <a:off x="3176410" y="3376952"/>
+              <a:ext cx="366890" cy="0"/>
+            </a:xfrm>
+            <a:prstGeom prst="straightConnector1">
+              <a:avLst/>
+            </a:prstGeom>
+            <a:ln>
+              <a:solidFill>
+                <a:schemeClr val="tx1"/>
+              </a:solidFill>
+              <a:tailEnd type="triangle"/>
+            </a:ln>
+          </p:spPr>
+          <p:style>
+            <a:lnRef idx="1">
+              <a:schemeClr val="accent1"/>
+            </a:lnRef>
+            <a:fillRef idx="0">
+              <a:schemeClr val="accent1"/>
+            </a:fillRef>
+            <a:effectRef idx="0">
+              <a:schemeClr val="accent1"/>
+            </a:effectRef>
+            <a:fontRef idx="minor">
+              <a:schemeClr val="tx1"/>
+            </a:fontRef>
+          </p:style>
+        </p:cxnSp>
+        <p:sp>
+          <p:nvSpPr>
+            <p:cNvPr id="15" name="TextBox 14"/>
+            <p:cNvSpPr txBox="1"/>
+            <p:nvPr/>
+          </p:nvSpPr>
+          <p:spPr>
+            <a:xfrm>
+              <a:off x="3543300" y="3259696"/>
+              <a:ext cx="673100" cy="276999"/>
+            </a:xfrm>
+            <a:prstGeom prst="rect">
+              <a:avLst/>
+            </a:prstGeom>
+            <a:noFill/>
+          </p:spPr>
+          <p:txBody>
+            <a:bodyPr wrap="square" rtlCol="0">
+              <a:spAutoFit/>
+            </a:bodyPr>
+            <a:lstStyle/>
+            <a:p>
+              <a:r>
+                <a:rPr lang="en-US" altLang="zh-CN" sz="1200" dirty="0" smtClean="0"/>
+                <a:t>MQW</a:t>
+              </a:r>
+              <a:endParaRPr lang="en-US" sz="1200" dirty="0"/>
+            </a:p>
+          </p:txBody>
+        </p:sp>
+        <p:cxnSp>
+          <p:nvCxnSpPr>
+            <p:cNvPr id="16" name="Straight Arrow Connector 15"/>
+            <p:cNvCxnSpPr/>
+            <p:nvPr/>
+          </p:nvCxnSpPr>
+          <p:spPr>
+            <a:xfrm>
+              <a:off x="3176410" y="3683705"/>
+              <a:ext cx="366890" cy="0"/>
+            </a:xfrm>
+            <a:prstGeom prst="straightConnector1">
+              <a:avLst/>
+            </a:prstGeom>
+            <a:ln>
+              <a:solidFill>
+                <a:schemeClr val="tx1"/>
+              </a:solidFill>
+              <a:tailEnd type="triangle"/>
+            </a:ln>
+          </p:spPr>
+          <p:style>
+            <a:lnRef idx="1">
+              <a:schemeClr val="accent1"/>
+            </a:lnRef>
+            <a:fillRef idx="0">
+              <a:schemeClr val="accent1"/>
+            </a:fillRef>
+            <a:effectRef idx="0">
+              <a:schemeClr val="accent1"/>
+            </a:effectRef>
+            <a:fontRef idx="minor">
+              <a:schemeClr val="tx1"/>
+            </a:fontRef>
+          </p:style>
+        </p:cxnSp>
+        <p:sp>
+          <p:nvSpPr>
+            <p:cNvPr id="17" name="TextBox 16"/>
+            <p:cNvSpPr txBox="1"/>
+            <p:nvPr/>
+          </p:nvSpPr>
+          <p:spPr>
+            <a:xfrm>
+              <a:off x="3543300" y="3562639"/>
+              <a:ext cx="673100" cy="276999"/>
+            </a:xfrm>
+            <a:prstGeom prst="rect">
+              <a:avLst/>
+            </a:prstGeom>
+            <a:noFill/>
+          </p:spPr>
+          <p:txBody>
+            <a:bodyPr wrap="square" rtlCol="0">
+              <a:spAutoFit/>
+            </a:bodyPr>
+            <a:lstStyle/>
+            <a:p>
+              <a:r>
+                <a:rPr lang="en-US" sz="1200" dirty="0" smtClean="0"/>
+                <a:t>n-</a:t>
+              </a:r>
+              <a:r>
+                <a:rPr lang="en-US" sz="1200" dirty="0" err="1" smtClean="0"/>
+                <a:t>InP</a:t>
+              </a:r>
+              <a:endParaRPr lang="en-US" sz="1200" dirty="0"/>
+            </a:p>
+          </p:txBody>
+        </p:sp>
+      </p:grpSp>
     </p:spTree>
     <p:extLst>
       <p:ext uri="{BB962C8B-B14F-4D97-AF65-F5344CB8AC3E}">
-        <p14:creationId xmlns:p14="http://schemas.microsoft.com/office/powerpoint/2010/main" val="3182379709"/>
+        <p14:creationId xmlns:p14="http://schemas.microsoft.com/office/powerpoint/2010/main" val="449267788"/>
       </p:ext>
     </p:extLst>
   </p:cSld>

</xml_diff>